<commit_message>
Deploying to github_page from @ ShaharSalhov/hangman_game@eb60049f2ac53c7b84464047bc51958007d83fb7 🚀
</commit_message>
<xml_diff>
--- a/pics/Presentation1.pptx
+++ b/pics/Presentation1.pptx
@@ -4,9 +4,13 @@
   <p:sldMasterIdLst>
     <p:sldMasterId id="2147483648" r:id="rId1"/>
   </p:sldMasterIdLst>
+  <p:notesMasterIdLst>
+    <p:notesMasterId r:id="rId5"/>
+  </p:notesMasterIdLst>
   <p:sldIdLst>
     <p:sldId id="256" r:id="rId2"/>
     <p:sldId id="257" r:id="rId3"/>
+    <p:sldId id="258" r:id="rId4"/>
   </p:sldIdLst>
   <p:sldSz cx="12192000" cy="6858000"/>
   <p:notesSz cx="6858000" cy="9144000"/>
@@ -113,6 +117,440 @@
 </p:presentation>
 </file>
 
+<file path=ppt/notesMasters/notesMaster1.xml><?xml version="1.0" encoding="utf-8"?>
+<p:notesMaster xmlns:a="http://schemas.openxmlformats.org/drawingml/2006/main" xmlns:r="http://schemas.openxmlformats.org/officeDocument/2006/relationships" xmlns:p="http://schemas.openxmlformats.org/presentationml/2006/main">
+  <p:cSld>
+    <p:bg>
+      <p:bgRef idx="1001">
+        <a:schemeClr val="bg1"/>
+      </p:bgRef>
+    </p:bg>
+    <p:spTree>
+      <p:nvGrpSpPr>
+        <p:cNvPr id="1" name=""/>
+        <p:cNvGrpSpPr/>
+        <p:nvPr/>
+      </p:nvGrpSpPr>
+      <p:grpSpPr>
+        <a:xfrm>
+          <a:off x="0" y="0"/>
+          <a:ext cx="0" cy="0"/>
+          <a:chOff x="0" y="0"/>
+          <a:chExt cx="0" cy="0"/>
+        </a:xfrm>
+      </p:grpSpPr>
+      <p:sp>
+        <p:nvSpPr>
+          <p:cNvPr id="2" name="Header Placeholder 1"/>
+          <p:cNvSpPr>
+            <a:spLocks noGrp="1"/>
+          </p:cNvSpPr>
+          <p:nvPr>
+            <p:ph type="hdr" sz="quarter"/>
+          </p:nvPr>
+        </p:nvSpPr>
+        <p:spPr>
+          <a:xfrm>
+            <a:off x="0" y="0"/>
+            <a:ext cx="2971800" cy="458788"/>
+          </a:xfrm>
+          <a:prstGeom prst="rect">
+            <a:avLst/>
+          </a:prstGeom>
+        </p:spPr>
+        <p:txBody>
+          <a:bodyPr vert="horz" lIns="91440" tIns="45720" rIns="91440" bIns="45720" rtlCol="0"/>
+          <a:lstStyle>
+            <a:lvl1pPr algn="l">
+              <a:defRPr sz="1200"/>
+            </a:lvl1pPr>
+          </a:lstStyle>
+          <a:p>
+            <a:endParaRPr lang="en-IL"/>
+          </a:p>
+        </p:txBody>
+      </p:sp>
+      <p:sp>
+        <p:nvSpPr>
+          <p:cNvPr id="3" name="Date Placeholder 2"/>
+          <p:cNvSpPr>
+            <a:spLocks noGrp="1"/>
+          </p:cNvSpPr>
+          <p:nvPr>
+            <p:ph type="dt" idx="1"/>
+          </p:nvPr>
+        </p:nvSpPr>
+        <p:spPr>
+          <a:xfrm>
+            <a:off x="3884613" y="0"/>
+            <a:ext cx="2971800" cy="458788"/>
+          </a:xfrm>
+          <a:prstGeom prst="rect">
+            <a:avLst/>
+          </a:prstGeom>
+        </p:spPr>
+        <p:txBody>
+          <a:bodyPr vert="horz" lIns="91440" tIns="45720" rIns="91440" bIns="45720" rtlCol="0"/>
+          <a:lstStyle>
+            <a:lvl1pPr algn="r">
+              <a:defRPr sz="1200"/>
+            </a:lvl1pPr>
+          </a:lstStyle>
+          <a:p>
+            <a:fld id="{00A04D43-7B91-514F-A3C0-7946BB0D94F9}" type="datetimeFigureOut">
+              <a:rPr lang="en-IL" smtClean="0"/>
+              <a:t>11/06/2022</a:t>
+            </a:fld>
+            <a:endParaRPr lang="en-IL"/>
+          </a:p>
+        </p:txBody>
+      </p:sp>
+      <p:sp>
+        <p:nvSpPr>
+          <p:cNvPr id="4" name="Slide Image Placeholder 3"/>
+          <p:cNvSpPr>
+            <a:spLocks noGrp="1" noRot="1" noChangeAspect="1"/>
+          </p:cNvSpPr>
+          <p:nvPr>
+            <p:ph type="sldImg" idx="2"/>
+          </p:nvPr>
+        </p:nvSpPr>
+        <p:spPr>
+          <a:xfrm>
+            <a:off x="685800" y="1143000"/>
+            <a:ext cx="5486400" cy="3086100"/>
+          </a:xfrm>
+          <a:prstGeom prst="rect">
+            <a:avLst/>
+          </a:prstGeom>
+          <a:noFill/>
+          <a:ln w="12700">
+            <a:solidFill>
+              <a:prstClr val="black"/>
+            </a:solidFill>
+          </a:ln>
+        </p:spPr>
+        <p:txBody>
+          <a:bodyPr vert="horz" lIns="91440" tIns="45720" rIns="91440" bIns="45720" rtlCol="0" anchor="ctr"/>
+          <a:lstStyle/>
+          <a:p>
+            <a:endParaRPr lang="en-IL"/>
+          </a:p>
+        </p:txBody>
+      </p:sp>
+      <p:sp>
+        <p:nvSpPr>
+          <p:cNvPr id="5" name="Notes Placeholder 4"/>
+          <p:cNvSpPr>
+            <a:spLocks noGrp="1"/>
+          </p:cNvSpPr>
+          <p:nvPr>
+            <p:ph type="body" sz="quarter" idx="3"/>
+          </p:nvPr>
+        </p:nvSpPr>
+        <p:spPr>
+          <a:xfrm>
+            <a:off x="685800" y="4400550"/>
+            <a:ext cx="5486400" cy="3600450"/>
+          </a:xfrm>
+          <a:prstGeom prst="rect">
+            <a:avLst/>
+          </a:prstGeom>
+        </p:spPr>
+        <p:txBody>
+          <a:bodyPr vert="horz" lIns="91440" tIns="45720" rIns="91440" bIns="45720" rtlCol="0"/>
+          <a:lstStyle/>
+          <a:p>
+            <a:pPr lvl="0"/>
+            <a:r>
+              <a:rPr lang="en-US"/>
+              <a:t>Click to edit Master text styles</a:t>
+            </a:r>
+          </a:p>
+          <a:p>
+            <a:pPr lvl="1"/>
+            <a:r>
+              <a:rPr lang="en-US"/>
+              <a:t>Second level</a:t>
+            </a:r>
+          </a:p>
+          <a:p>
+            <a:pPr lvl="2"/>
+            <a:r>
+              <a:rPr lang="en-US"/>
+              <a:t>Third level</a:t>
+            </a:r>
+          </a:p>
+          <a:p>
+            <a:pPr lvl="3"/>
+            <a:r>
+              <a:rPr lang="en-US"/>
+              <a:t>Fourth level</a:t>
+            </a:r>
+          </a:p>
+          <a:p>
+            <a:pPr lvl="4"/>
+            <a:r>
+              <a:rPr lang="en-US"/>
+              <a:t>Fifth level</a:t>
+            </a:r>
+            <a:endParaRPr lang="en-IL"/>
+          </a:p>
+        </p:txBody>
+      </p:sp>
+      <p:sp>
+        <p:nvSpPr>
+          <p:cNvPr id="6" name="Footer Placeholder 5"/>
+          <p:cNvSpPr>
+            <a:spLocks noGrp="1"/>
+          </p:cNvSpPr>
+          <p:nvPr>
+            <p:ph type="ftr" sz="quarter" idx="4"/>
+          </p:nvPr>
+        </p:nvSpPr>
+        <p:spPr>
+          <a:xfrm>
+            <a:off x="0" y="8685213"/>
+            <a:ext cx="2971800" cy="458787"/>
+          </a:xfrm>
+          <a:prstGeom prst="rect">
+            <a:avLst/>
+          </a:prstGeom>
+        </p:spPr>
+        <p:txBody>
+          <a:bodyPr vert="horz" lIns="91440" tIns="45720" rIns="91440" bIns="45720" rtlCol="0" anchor="b"/>
+          <a:lstStyle>
+            <a:lvl1pPr algn="l">
+              <a:defRPr sz="1200"/>
+            </a:lvl1pPr>
+          </a:lstStyle>
+          <a:p>
+            <a:endParaRPr lang="en-IL"/>
+          </a:p>
+        </p:txBody>
+      </p:sp>
+      <p:sp>
+        <p:nvSpPr>
+          <p:cNvPr id="7" name="Slide Number Placeholder 6"/>
+          <p:cNvSpPr>
+            <a:spLocks noGrp="1"/>
+          </p:cNvSpPr>
+          <p:nvPr>
+            <p:ph type="sldNum" sz="quarter" idx="5"/>
+          </p:nvPr>
+        </p:nvSpPr>
+        <p:spPr>
+          <a:xfrm>
+            <a:off x="3884613" y="8685213"/>
+            <a:ext cx="2971800" cy="458787"/>
+          </a:xfrm>
+          <a:prstGeom prst="rect">
+            <a:avLst/>
+          </a:prstGeom>
+        </p:spPr>
+        <p:txBody>
+          <a:bodyPr vert="horz" lIns="91440" tIns="45720" rIns="91440" bIns="45720" rtlCol="0" anchor="b"/>
+          <a:lstStyle>
+            <a:lvl1pPr algn="r">
+              <a:defRPr sz="1200"/>
+            </a:lvl1pPr>
+          </a:lstStyle>
+          <a:p>
+            <a:fld id="{E3D95403-252C-BA48-9DE1-28AE00E9A926}" type="slidenum">
+              <a:rPr lang="en-IL" smtClean="0"/>
+              <a:t>‹#›</a:t>
+            </a:fld>
+            <a:endParaRPr lang="en-IL"/>
+          </a:p>
+        </p:txBody>
+      </p:sp>
+    </p:spTree>
+    <p:extLst>
+      <p:ext uri="{BB962C8B-B14F-4D97-AF65-F5344CB8AC3E}">
+        <p14:creationId xmlns:p14="http://schemas.microsoft.com/office/powerpoint/2010/main" val="3693769923"/>
+      </p:ext>
+    </p:extLst>
+  </p:cSld>
+  <p:clrMap bg1="lt1" tx1="dk1" bg2="lt2" tx2="dk2" accent1="accent1" accent2="accent2" accent3="accent3" accent4="accent4" accent5="accent5" accent6="accent6" hlink="hlink" folHlink="folHlink"/>
+  <p:notesStyle>
+    <a:lvl1pPr marL="0" algn="l" defTabSz="914400" rtl="0" eaLnBrk="1" latinLnBrk="0" hangingPunct="1">
+      <a:defRPr sz="1200" kern="1200">
+        <a:solidFill>
+          <a:schemeClr val="tx1"/>
+        </a:solidFill>
+        <a:latin typeface="+mn-lt"/>
+        <a:ea typeface="+mn-ea"/>
+        <a:cs typeface="+mn-cs"/>
+      </a:defRPr>
+    </a:lvl1pPr>
+    <a:lvl2pPr marL="457200" algn="l" defTabSz="914400" rtl="0" eaLnBrk="1" latinLnBrk="0" hangingPunct="1">
+      <a:defRPr sz="1200" kern="1200">
+        <a:solidFill>
+          <a:schemeClr val="tx1"/>
+        </a:solidFill>
+        <a:latin typeface="+mn-lt"/>
+        <a:ea typeface="+mn-ea"/>
+        <a:cs typeface="+mn-cs"/>
+      </a:defRPr>
+    </a:lvl2pPr>
+    <a:lvl3pPr marL="914400" algn="l" defTabSz="914400" rtl="0" eaLnBrk="1" latinLnBrk="0" hangingPunct="1">
+      <a:defRPr sz="1200" kern="1200">
+        <a:solidFill>
+          <a:schemeClr val="tx1"/>
+        </a:solidFill>
+        <a:latin typeface="+mn-lt"/>
+        <a:ea typeface="+mn-ea"/>
+        <a:cs typeface="+mn-cs"/>
+      </a:defRPr>
+    </a:lvl3pPr>
+    <a:lvl4pPr marL="1371600" algn="l" defTabSz="914400" rtl="0" eaLnBrk="1" latinLnBrk="0" hangingPunct="1">
+      <a:defRPr sz="1200" kern="1200">
+        <a:solidFill>
+          <a:schemeClr val="tx1"/>
+        </a:solidFill>
+        <a:latin typeface="+mn-lt"/>
+        <a:ea typeface="+mn-ea"/>
+        <a:cs typeface="+mn-cs"/>
+      </a:defRPr>
+    </a:lvl4pPr>
+    <a:lvl5pPr marL="1828800" algn="l" defTabSz="914400" rtl="0" eaLnBrk="1" latinLnBrk="0" hangingPunct="1">
+      <a:defRPr sz="1200" kern="1200">
+        <a:solidFill>
+          <a:schemeClr val="tx1"/>
+        </a:solidFill>
+        <a:latin typeface="+mn-lt"/>
+        <a:ea typeface="+mn-ea"/>
+        <a:cs typeface="+mn-cs"/>
+      </a:defRPr>
+    </a:lvl5pPr>
+    <a:lvl6pPr marL="2286000" algn="l" defTabSz="914400" rtl="0" eaLnBrk="1" latinLnBrk="0" hangingPunct="1">
+      <a:defRPr sz="1200" kern="1200">
+        <a:solidFill>
+          <a:schemeClr val="tx1"/>
+        </a:solidFill>
+        <a:latin typeface="+mn-lt"/>
+        <a:ea typeface="+mn-ea"/>
+        <a:cs typeface="+mn-cs"/>
+      </a:defRPr>
+    </a:lvl6pPr>
+    <a:lvl7pPr marL="2743200" algn="l" defTabSz="914400" rtl="0" eaLnBrk="1" latinLnBrk="0" hangingPunct="1">
+      <a:defRPr sz="1200" kern="1200">
+        <a:solidFill>
+          <a:schemeClr val="tx1"/>
+        </a:solidFill>
+        <a:latin typeface="+mn-lt"/>
+        <a:ea typeface="+mn-ea"/>
+        <a:cs typeface="+mn-cs"/>
+      </a:defRPr>
+    </a:lvl7pPr>
+    <a:lvl8pPr marL="3200400" algn="l" defTabSz="914400" rtl="0" eaLnBrk="1" latinLnBrk="0" hangingPunct="1">
+      <a:defRPr sz="1200" kern="1200">
+        <a:solidFill>
+          <a:schemeClr val="tx1"/>
+        </a:solidFill>
+        <a:latin typeface="+mn-lt"/>
+        <a:ea typeface="+mn-ea"/>
+        <a:cs typeface="+mn-cs"/>
+      </a:defRPr>
+    </a:lvl8pPr>
+    <a:lvl9pPr marL="3657600" algn="l" defTabSz="914400" rtl="0" eaLnBrk="1" latinLnBrk="0" hangingPunct="1">
+      <a:defRPr sz="1200" kern="1200">
+        <a:solidFill>
+          <a:schemeClr val="tx1"/>
+        </a:solidFill>
+        <a:latin typeface="+mn-lt"/>
+        <a:ea typeface="+mn-ea"/>
+        <a:cs typeface="+mn-cs"/>
+      </a:defRPr>
+    </a:lvl9pPr>
+  </p:notesStyle>
+</p:notesMaster>
+</file>
+
+<file path=ppt/notesSlides/notesSlide1.xml><?xml version="1.0" encoding="utf-8"?>
+<p:notes xmlns:a="http://schemas.openxmlformats.org/drawingml/2006/main" xmlns:r="http://schemas.openxmlformats.org/officeDocument/2006/relationships" xmlns:p="http://schemas.openxmlformats.org/presentationml/2006/main">
+  <p:cSld>
+    <p:spTree>
+      <p:nvGrpSpPr>
+        <p:cNvPr id="1" name=""/>
+        <p:cNvGrpSpPr/>
+        <p:nvPr/>
+      </p:nvGrpSpPr>
+      <p:grpSpPr>
+        <a:xfrm>
+          <a:off x="0" y="0"/>
+          <a:ext cx="0" cy="0"/>
+          <a:chOff x="0" y="0"/>
+          <a:chExt cx="0" cy="0"/>
+        </a:xfrm>
+      </p:grpSpPr>
+      <p:sp>
+        <p:nvSpPr>
+          <p:cNvPr id="2" name="Slide Image Placeholder 1"/>
+          <p:cNvSpPr>
+            <a:spLocks noGrp="1" noRot="1" noChangeAspect="1"/>
+          </p:cNvSpPr>
+          <p:nvPr>
+            <p:ph type="sldImg"/>
+          </p:nvPr>
+        </p:nvSpPr>
+        <p:spPr/>
+      </p:sp>
+      <p:sp>
+        <p:nvSpPr>
+          <p:cNvPr id="3" name="Notes Placeholder 2"/>
+          <p:cNvSpPr>
+            <a:spLocks noGrp="1"/>
+          </p:cNvSpPr>
+          <p:nvPr>
+            <p:ph type="body" idx="1"/>
+          </p:nvPr>
+        </p:nvSpPr>
+        <p:spPr/>
+        <p:txBody>
+          <a:bodyPr/>
+          <a:lstStyle/>
+          <a:p>
+            <a:endParaRPr lang="en-IL" dirty="0"/>
+          </a:p>
+        </p:txBody>
+      </p:sp>
+      <p:sp>
+        <p:nvSpPr>
+          <p:cNvPr id="4" name="Slide Number Placeholder 3"/>
+          <p:cNvSpPr>
+            <a:spLocks noGrp="1"/>
+          </p:cNvSpPr>
+          <p:nvPr>
+            <p:ph type="sldNum" sz="quarter" idx="5"/>
+          </p:nvPr>
+        </p:nvSpPr>
+        <p:spPr/>
+        <p:txBody>
+          <a:bodyPr/>
+          <a:lstStyle/>
+          <a:p>
+            <a:fld id="{E3D95403-252C-BA48-9DE1-28AE00E9A926}" type="slidenum">
+              <a:rPr lang="en-IL" smtClean="0"/>
+              <a:t>3</a:t>
+            </a:fld>
+            <a:endParaRPr lang="en-IL"/>
+          </a:p>
+        </p:txBody>
+      </p:sp>
+    </p:spTree>
+    <p:extLst>
+      <p:ext uri="{BB962C8B-B14F-4D97-AF65-F5344CB8AC3E}">
+        <p14:creationId xmlns:p14="http://schemas.microsoft.com/office/powerpoint/2010/main" val="1584622329"/>
+      </p:ext>
+    </p:extLst>
+  </p:cSld>
+  <p:clrMapOvr>
+    <a:masterClrMapping/>
+  </p:clrMapOvr>
+</p:notes>
+</file>
+
 <file path=ppt/slideLayouts/slideLayout1.xml><?xml version="1.0" encoding="utf-8"?>
 <p:sldLayout xmlns:a="http://schemas.openxmlformats.org/drawingml/2006/main" xmlns:r="http://schemas.openxmlformats.org/officeDocument/2006/relationships" xmlns:p="http://schemas.openxmlformats.org/presentationml/2006/main" type="title" preserve="1">
   <p:cSld name="Title Slide">
@@ -262,7 +700,7 @@
           <a:p>
             <a:fld id="{D28EEE30-0DFC-B649-9D10-686B575B56EB}" type="datetimeFigureOut">
               <a:rPr lang="en-IL" smtClean="0"/>
-              <a:t>09/06/2022</a:t>
+              <a:t>11/06/2022</a:t>
             </a:fld>
             <a:endParaRPr lang="en-IL"/>
           </a:p>
@@ -462,7 +900,7 @@
           <a:p>
             <a:fld id="{D28EEE30-0DFC-B649-9D10-686B575B56EB}" type="datetimeFigureOut">
               <a:rPr lang="en-IL" smtClean="0"/>
-              <a:t>09/06/2022</a:t>
+              <a:t>11/06/2022</a:t>
             </a:fld>
             <a:endParaRPr lang="en-IL"/>
           </a:p>
@@ -672,7 +1110,7 @@
           <a:p>
             <a:fld id="{D28EEE30-0DFC-B649-9D10-686B575B56EB}" type="datetimeFigureOut">
               <a:rPr lang="en-IL" smtClean="0"/>
-              <a:t>09/06/2022</a:t>
+              <a:t>11/06/2022</a:t>
             </a:fld>
             <a:endParaRPr lang="en-IL"/>
           </a:p>
@@ -872,7 +1310,7 @@
           <a:p>
             <a:fld id="{D28EEE30-0DFC-B649-9D10-686B575B56EB}" type="datetimeFigureOut">
               <a:rPr lang="en-IL" smtClean="0"/>
-              <a:t>09/06/2022</a:t>
+              <a:t>11/06/2022</a:t>
             </a:fld>
             <a:endParaRPr lang="en-IL"/>
           </a:p>
@@ -1148,7 +1586,7 @@
           <a:p>
             <a:fld id="{D28EEE30-0DFC-B649-9D10-686B575B56EB}" type="datetimeFigureOut">
               <a:rPr lang="en-IL" smtClean="0"/>
-              <a:t>09/06/2022</a:t>
+              <a:t>11/06/2022</a:t>
             </a:fld>
             <a:endParaRPr lang="en-IL"/>
           </a:p>
@@ -1416,7 +1854,7 @@
           <a:p>
             <a:fld id="{D28EEE30-0DFC-B649-9D10-686B575B56EB}" type="datetimeFigureOut">
               <a:rPr lang="en-IL" smtClean="0"/>
-              <a:t>09/06/2022</a:t>
+              <a:t>11/06/2022</a:t>
             </a:fld>
             <a:endParaRPr lang="en-IL"/>
           </a:p>
@@ -1831,7 +2269,7 @@
           <a:p>
             <a:fld id="{D28EEE30-0DFC-B649-9D10-686B575B56EB}" type="datetimeFigureOut">
               <a:rPr lang="en-IL" smtClean="0"/>
-              <a:t>09/06/2022</a:t>
+              <a:t>11/06/2022</a:t>
             </a:fld>
             <a:endParaRPr lang="en-IL"/>
           </a:p>
@@ -1973,7 +2411,7 @@
           <a:p>
             <a:fld id="{D28EEE30-0DFC-B649-9D10-686B575B56EB}" type="datetimeFigureOut">
               <a:rPr lang="en-IL" smtClean="0"/>
-              <a:t>09/06/2022</a:t>
+              <a:t>11/06/2022</a:t>
             </a:fld>
             <a:endParaRPr lang="en-IL"/>
           </a:p>
@@ -2086,7 +2524,7 @@
           <a:p>
             <a:fld id="{D28EEE30-0DFC-B649-9D10-686B575B56EB}" type="datetimeFigureOut">
               <a:rPr lang="en-IL" smtClean="0"/>
-              <a:t>09/06/2022</a:t>
+              <a:t>11/06/2022</a:t>
             </a:fld>
             <a:endParaRPr lang="en-IL"/>
           </a:p>
@@ -2399,7 +2837,7 @@
           <a:p>
             <a:fld id="{D28EEE30-0DFC-B649-9D10-686B575B56EB}" type="datetimeFigureOut">
               <a:rPr lang="en-IL" smtClean="0"/>
-              <a:t>09/06/2022</a:t>
+              <a:t>11/06/2022</a:t>
             </a:fld>
             <a:endParaRPr lang="en-IL"/>
           </a:p>
@@ -2688,7 +3126,7 @@
           <a:p>
             <a:fld id="{D28EEE30-0DFC-B649-9D10-686B575B56EB}" type="datetimeFigureOut">
               <a:rPr lang="en-IL" smtClean="0"/>
-              <a:t>09/06/2022</a:t>
+              <a:t>11/06/2022</a:t>
             </a:fld>
             <a:endParaRPr lang="en-IL"/>
           </a:p>
@@ -2931,7 +3369,7 @@
           <a:p>
             <a:fld id="{D28EEE30-0DFC-B649-9D10-686B575B56EB}" type="datetimeFigureOut">
               <a:rPr lang="en-IL" smtClean="0"/>
-              <a:t>09/06/2022</a:t>
+              <a:t>11/06/2022</a:t>
             </a:fld>
             <a:endParaRPr lang="en-IL"/>
           </a:p>
@@ -3993,6 +4431,182 @@
 </p:sld>
 </file>
 
+<file path=ppt/slides/slide3.xml><?xml version="1.0" encoding="utf-8"?>
+<p:sld xmlns:a="http://schemas.openxmlformats.org/drawingml/2006/main" xmlns:r="http://schemas.openxmlformats.org/officeDocument/2006/relationships" xmlns:p="http://schemas.openxmlformats.org/presentationml/2006/main">
+  <p:cSld>
+    <p:bg>
+      <p:bgPr>
+        <a:solidFill>
+          <a:srgbClr val="086E3B"/>
+        </a:solidFill>
+        <a:effectLst/>
+      </p:bgPr>
+    </p:bg>
+    <p:spTree>
+      <p:nvGrpSpPr>
+        <p:cNvPr id="1" name=""/>
+        <p:cNvGrpSpPr/>
+        <p:nvPr/>
+      </p:nvGrpSpPr>
+      <p:grpSpPr>
+        <a:xfrm>
+          <a:off x="0" y="0"/>
+          <a:ext cx="0" cy="0"/>
+          <a:chOff x="0" y="0"/>
+          <a:chExt cx="0" cy="0"/>
+        </a:xfrm>
+      </p:grpSpPr>
+      <p:sp>
+        <p:nvSpPr>
+          <p:cNvPr id="4" name="Rectangle 3">
+            <a:extLst>
+              <a:ext uri="{FF2B5EF4-FFF2-40B4-BE49-F238E27FC236}">
+                <a16:creationId xmlns:a16="http://schemas.microsoft.com/office/drawing/2014/main" id="{19C33F28-3D07-8712-0C19-6679577B3F89}"/>
+              </a:ext>
+            </a:extLst>
+          </p:cNvPr>
+          <p:cNvSpPr/>
+          <p:nvPr/>
+        </p:nvSpPr>
+        <p:spPr>
+          <a:xfrm>
+            <a:off x="0" y="-1"/>
+            <a:ext cx="12192000" cy="5770593"/>
+          </a:xfrm>
+          <a:prstGeom prst="rect">
+            <a:avLst/>
+          </a:prstGeom>
+          <a:noFill/>
+          <a:ln w="114300">
+            <a:solidFill>
+              <a:srgbClr val="6B3815"/>
+            </a:solidFill>
+          </a:ln>
+        </p:spPr>
+        <p:style>
+          <a:lnRef idx="2">
+            <a:schemeClr val="accent1">
+              <a:shade val="50000"/>
+            </a:schemeClr>
+          </a:lnRef>
+          <a:fillRef idx="1">
+            <a:schemeClr val="accent1"/>
+          </a:fillRef>
+          <a:effectRef idx="0">
+            <a:schemeClr val="accent1"/>
+          </a:effectRef>
+          <a:fontRef idx="minor">
+            <a:schemeClr val="lt1"/>
+          </a:fontRef>
+        </p:style>
+        <p:txBody>
+          <a:bodyPr rtlCol="0" anchor="ctr"/>
+          <a:lstStyle/>
+          <a:p>
+            <a:pPr algn="ctr"/>
+            <a:endParaRPr lang="en-IL" dirty="0"/>
+          </a:p>
+        </p:txBody>
+      </p:sp>
+      <p:cxnSp>
+        <p:nvCxnSpPr>
+          <p:cNvPr id="6" name="Straight Connector 5">
+            <a:extLst>
+              <a:ext uri="{FF2B5EF4-FFF2-40B4-BE49-F238E27FC236}">
+                <a16:creationId xmlns:a16="http://schemas.microsoft.com/office/drawing/2014/main" id="{ED0D8D8E-40D0-7AD6-F5CC-9EA6E0B213FA}"/>
+              </a:ext>
+            </a:extLst>
+          </p:cNvPr>
+          <p:cNvCxnSpPr>
+            <a:cxnSpLocks/>
+          </p:cNvCxnSpPr>
+          <p:nvPr/>
+        </p:nvCxnSpPr>
+        <p:spPr>
+          <a:xfrm>
+            <a:off x="55959" y="5653624"/>
+            <a:ext cx="12080081" cy="0"/>
+          </a:xfrm>
+          <a:prstGeom prst="line">
+            <a:avLst/>
+          </a:prstGeom>
+          <a:ln w="130175">
+            <a:solidFill>
+              <a:srgbClr val="854E2A"/>
+            </a:solidFill>
+          </a:ln>
+        </p:spPr>
+        <p:style>
+          <a:lnRef idx="1">
+            <a:schemeClr val="accent1"/>
+          </a:lnRef>
+          <a:fillRef idx="0">
+            <a:schemeClr val="accent1"/>
+          </a:fillRef>
+          <a:effectRef idx="0">
+            <a:schemeClr val="accent1"/>
+          </a:effectRef>
+          <a:fontRef idx="minor">
+            <a:schemeClr val="tx1"/>
+          </a:fontRef>
+        </p:style>
+      </p:cxnSp>
+      <p:cxnSp>
+        <p:nvCxnSpPr>
+          <p:cNvPr id="12" name="Straight Connector 11">
+            <a:extLst>
+              <a:ext uri="{FF2B5EF4-FFF2-40B4-BE49-F238E27FC236}">
+                <a16:creationId xmlns:a16="http://schemas.microsoft.com/office/drawing/2014/main" id="{CE1768C1-6CBB-0D43-2A7C-ADA758938813}"/>
+              </a:ext>
+            </a:extLst>
+          </p:cNvPr>
+          <p:cNvCxnSpPr>
+            <a:cxnSpLocks/>
+          </p:cNvCxnSpPr>
+          <p:nvPr/>
+        </p:nvCxnSpPr>
+        <p:spPr>
+          <a:xfrm>
+            <a:off x="-57666" y="5885108"/>
+            <a:ext cx="12344401" cy="0"/>
+          </a:xfrm>
+          <a:prstGeom prst="line">
+            <a:avLst/>
+          </a:prstGeom>
+          <a:ln w="130175">
+            <a:solidFill>
+              <a:schemeClr val="tx1"/>
+            </a:solidFill>
+          </a:ln>
+        </p:spPr>
+        <p:style>
+          <a:lnRef idx="1">
+            <a:schemeClr val="accent1"/>
+          </a:lnRef>
+          <a:fillRef idx="0">
+            <a:schemeClr val="accent1"/>
+          </a:fillRef>
+          <a:effectRef idx="0">
+            <a:schemeClr val="accent1"/>
+          </a:effectRef>
+          <a:fontRef idx="minor">
+            <a:schemeClr val="tx1"/>
+          </a:fontRef>
+        </p:style>
+      </p:cxnSp>
+    </p:spTree>
+    <p:extLst>
+      <p:ext uri="{BB962C8B-B14F-4D97-AF65-F5344CB8AC3E}">
+        <p14:creationId xmlns:p14="http://schemas.microsoft.com/office/powerpoint/2010/main" val="381717333"/>
+      </p:ext>
+    </p:extLst>
+  </p:cSld>
+  <p:clrMapOvr>
+    <a:masterClrMapping/>
+  </p:clrMapOvr>
+</p:sld>
+</file>
+
 <file path=ppt/theme/theme1.xml><?xml version="1.0" encoding="utf-8"?>
 <a:theme xmlns:a="http://schemas.openxmlformats.org/drawingml/2006/main" name="Office Theme">
   <a:themeElements>
@@ -4286,4 +4900,299 @@
     </a:ext>
   </a:extLst>
 </a:theme>
+</file>
+
+<file path=ppt/theme/theme2.xml><?xml version="1.0" encoding="utf-8"?>
+<a:theme xmlns:a="http://schemas.openxmlformats.org/drawingml/2006/main" name="Office Theme">
+  <a:themeElements>
+    <a:clrScheme name="Office">
+      <a:dk1>
+        <a:sysClr val="windowText" lastClr="000000"/>
+      </a:dk1>
+      <a:lt1>
+        <a:sysClr val="window" lastClr="FFFFFF"/>
+      </a:lt1>
+      <a:dk2>
+        <a:srgbClr val="44546A"/>
+      </a:dk2>
+      <a:lt2>
+        <a:srgbClr val="E7E6E6"/>
+      </a:lt2>
+      <a:accent1>
+        <a:srgbClr val="4472C4"/>
+      </a:accent1>
+      <a:accent2>
+        <a:srgbClr val="ED7D31"/>
+      </a:accent2>
+      <a:accent3>
+        <a:srgbClr val="A5A5A5"/>
+      </a:accent3>
+      <a:accent4>
+        <a:srgbClr val="FFC000"/>
+      </a:accent4>
+      <a:accent5>
+        <a:srgbClr val="5B9BD5"/>
+      </a:accent5>
+      <a:accent6>
+        <a:srgbClr val="70AD47"/>
+      </a:accent6>
+      <a:hlink>
+        <a:srgbClr val="0563C1"/>
+      </a:hlink>
+      <a:folHlink>
+        <a:srgbClr val="954F72"/>
+      </a:folHlink>
+    </a:clrScheme>
+    <a:fontScheme name="Office">
+      <a:majorFont>
+        <a:latin typeface="Calibri Light" panose="020F0302020204030204"/>
+        <a:ea typeface=""/>
+        <a:cs typeface=""/>
+        <a:font script="Jpan" typeface="游ゴシック Light"/>
+        <a:font script="Hang" typeface="맑은 고딕"/>
+        <a:font script="Hans" typeface="等线 Light"/>
+        <a:font script="Hant" typeface="新細明體"/>
+        <a:font script="Arab" typeface="Times New Roman"/>
+        <a:font script="Hebr" typeface="Times New Roman"/>
+        <a:font script="Thai" typeface="Angsana New"/>
+        <a:font script="Ethi" typeface="Nyala"/>
+        <a:font script="Beng" typeface="Vrinda"/>
+        <a:font script="Gujr" typeface="Shruti"/>
+        <a:font script="Khmr" typeface="MoolBoran"/>
+        <a:font script="Knda" typeface="Tunga"/>
+        <a:font script="Guru" typeface="Raavi"/>
+        <a:font script="Cans" typeface="Euphemia"/>
+        <a:font script="Cher" typeface="Plantagenet Cherokee"/>
+        <a:font script="Yiii" typeface="Microsoft Yi Baiti"/>
+        <a:font script="Tibt" typeface="Microsoft Himalaya"/>
+        <a:font script="Thaa" typeface="MV Boli"/>
+        <a:font script="Deva" typeface="Mangal"/>
+        <a:font script="Telu" typeface="Gautami"/>
+        <a:font script="Taml" typeface="Latha"/>
+        <a:font script="Syrc" typeface="Estrangelo Edessa"/>
+        <a:font script="Orya" typeface="Kalinga"/>
+        <a:font script="Mlym" typeface="Kartika"/>
+        <a:font script="Laoo" typeface="DokChampa"/>
+        <a:font script="Sinh" typeface="Iskoola Pota"/>
+        <a:font script="Mong" typeface="Mongolian Baiti"/>
+        <a:font script="Viet" typeface="Times New Roman"/>
+        <a:font script="Uigh" typeface="Microsoft Uighur"/>
+        <a:font script="Geor" typeface="Sylfaen"/>
+        <a:font script="Armn" typeface="Arial"/>
+        <a:font script="Bugi" typeface="Leelawadee UI"/>
+        <a:font script="Bopo" typeface="Microsoft JhengHei"/>
+        <a:font script="Java" typeface="Javanese Text"/>
+        <a:font script="Lisu" typeface="Segoe UI"/>
+        <a:font script="Mymr" typeface="Myanmar Text"/>
+        <a:font script="Nkoo" typeface="Ebrima"/>
+        <a:font script="Olck" typeface="Nirmala UI"/>
+        <a:font script="Osma" typeface="Ebrima"/>
+        <a:font script="Phag" typeface="Phagspa"/>
+        <a:font script="Syrn" typeface="Estrangelo Edessa"/>
+        <a:font script="Syrj" typeface="Estrangelo Edessa"/>
+        <a:font script="Syre" typeface="Estrangelo Edessa"/>
+        <a:font script="Sora" typeface="Nirmala UI"/>
+        <a:font script="Tale" typeface="Microsoft Tai Le"/>
+        <a:font script="Talu" typeface="Microsoft New Tai Lue"/>
+        <a:font script="Tfng" typeface="Ebrima"/>
+      </a:majorFont>
+      <a:minorFont>
+        <a:latin typeface="Calibri" panose="020F0502020204030204"/>
+        <a:ea typeface=""/>
+        <a:cs typeface=""/>
+        <a:font script="Jpan" typeface="游ゴシック"/>
+        <a:font script="Hang" typeface="맑은 고딕"/>
+        <a:font script="Hans" typeface="等线"/>
+        <a:font script="Hant" typeface="新細明體"/>
+        <a:font script="Arab" typeface="Arial"/>
+        <a:font script="Hebr" typeface="Arial"/>
+        <a:font script="Thai" typeface="Cordia New"/>
+        <a:font script="Ethi" typeface="Nyala"/>
+        <a:font script="Beng" typeface="Vrinda"/>
+        <a:font script="Gujr" typeface="Shruti"/>
+        <a:font script="Khmr" typeface="DaunPenh"/>
+        <a:font script="Knda" typeface="Tunga"/>
+        <a:font script="Guru" typeface="Raavi"/>
+        <a:font script="Cans" typeface="Euphemia"/>
+        <a:font script="Cher" typeface="Plantagenet Cherokee"/>
+        <a:font script="Yiii" typeface="Microsoft Yi Baiti"/>
+        <a:font script="Tibt" typeface="Microsoft Himalaya"/>
+        <a:font script="Thaa" typeface="MV Boli"/>
+        <a:font script="Deva" typeface="Mangal"/>
+        <a:font script="Telu" typeface="Gautami"/>
+        <a:font script="Taml" typeface="Latha"/>
+        <a:font script="Syrc" typeface="Estrangelo Edessa"/>
+        <a:font script="Orya" typeface="Kalinga"/>
+        <a:font script="Mlym" typeface="Kartika"/>
+        <a:font script="Laoo" typeface="DokChampa"/>
+        <a:font script="Sinh" typeface="Iskoola Pota"/>
+        <a:font script="Mong" typeface="Mongolian Baiti"/>
+        <a:font script="Viet" typeface="Arial"/>
+        <a:font script="Uigh" typeface="Microsoft Uighur"/>
+        <a:font script="Geor" typeface="Sylfaen"/>
+        <a:font script="Armn" typeface="Arial"/>
+        <a:font script="Bugi" typeface="Leelawadee UI"/>
+        <a:font script="Bopo" typeface="Microsoft JhengHei"/>
+        <a:font script="Java" typeface="Javanese Text"/>
+        <a:font script="Lisu" typeface="Segoe UI"/>
+        <a:font script="Mymr" typeface="Myanmar Text"/>
+        <a:font script="Nkoo" typeface="Ebrima"/>
+        <a:font script="Olck" typeface="Nirmala UI"/>
+        <a:font script="Osma" typeface="Ebrima"/>
+        <a:font script="Phag" typeface="Phagspa"/>
+        <a:font script="Syrn" typeface="Estrangelo Edessa"/>
+        <a:font script="Syrj" typeface="Estrangelo Edessa"/>
+        <a:font script="Syre" typeface="Estrangelo Edessa"/>
+        <a:font script="Sora" typeface="Nirmala UI"/>
+        <a:font script="Tale" typeface="Microsoft Tai Le"/>
+        <a:font script="Talu" typeface="Microsoft New Tai Lue"/>
+        <a:font script="Tfng" typeface="Ebrima"/>
+      </a:minorFont>
+    </a:fontScheme>
+    <a:fmtScheme name="Office">
+      <a:fillStyleLst>
+        <a:solidFill>
+          <a:schemeClr val="phClr"/>
+        </a:solidFill>
+        <a:gradFill rotWithShape="1">
+          <a:gsLst>
+            <a:gs pos="0">
+              <a:schemeClr val="phClr">
+                <a:lumMod val="110000"/>
+                <a:satMod val="105000"/>
+                <a:tint val="67000"/>
+              </a:schemeClr>
+            </a:gs>
+            <a:gs pos="50000">
+              <a:schemeClr val="phClr">
+                <a:lumMod val="105000"/>
+                <a:satMod val="103000"/>
+                <a:tint val="73000"/>
+              </a:schemeClr>
+            </a:gs>
+            <a:gs pos="100000">
+              <a:schemeClr val="phClr">
+                <a:lumMod val="105000"/>
+                <a:satMod val="109000"/>
+                <a:tint val="81000"/>
+              </a:schemeClr>
+            </a:gs>
+          </a:gsLst>
+          <a:lin ang="5400000" scaled="0"/>
+        </a:gradFill>
+        <a:gradFill rotWithShape="1">
+          <a:gsLst>
+            <a:gs pos="0">
+              <a:schemeClr val="phClr">
+                <a:satMod val="103000"/>
+                <a:lumMod val="102000"/>
+                <a:tint val="94000"/>
+              </a:schemeClr>
+            </a:gs>
+            <a:gs pos="50000">
+              <a:schemeClr val="phClr">
+                <a:satMod val="110000"/>
+                <a:lumMod val="100000"/>
+                <a:shade val="100000"/>
+              </a:schemeClr>
+            </a:gs>
+            <a:gs pos="100000">
+              <a:schemeClr val="phClr">
+                <a:lumMod val="99000"/>
+                <a:satMod val="120000"/>
+                <a:shade val="78000"/>
+              </a:schemeClr>
+            </a:gs>
+          </a:gsLst>
+          <a:lin ang="5400000" scaled="0"/>
+        </a:gradFill>
+      </a:fillStyleLst>
+      <a:lnStyleLst>
+        <a:ln w="6350" cap="flat" cmpd="sng" algn="ctr">
+          <a:solidFill>
+            <a:schemeClr val="phClr"/>
+          </a:solidFill>
+          <a:prstDash val="solid"/>
+          <a:miter lim="800000"/>
+        </a:ln>
+        <a:ln w="12700" cap="flat" cmpd="sng" algn="ctr">
+          <a:solidFill>
+            <a:schemeClr val="phClr"/>
+          </a:solidFill>
+          <a:prstDash val="solid"/>
+          <a:miter lim="800000"/>
+        </a:ln>
+        <a:ln w="19050" cap="flat" cmpd="sng" algn="ctr">
+          <a:solidFill>
+            <a:schemeClr val="phClr"/>
+          </a:solidFill>
+          <a:prstDash val="solid"/>
+          <a:miter lim="800000"/>
+        </a:ln>
+      </a:lnStyleLst>
+      <a:effectStyleLst>
+        <a:effectStyle>
+          <a:effectLst/>
+        </a:effectStyle>
+        <a:effectStyle>
+          <a:effectLst/>
+        </a:effectStyle>
+        <a:effectStyle>
+          <a:effectLst>
+            <a:outerShdw blurRad="57150" dist="19050" dir="5400000" algn="ctr" rotWithShape="0">
+              <a:srgbClr val="000000">
+                <a:alpha val="63000"/>
+              </a:srgbClr>
+            </a:outerShdw>
+          </a:effectLst>
+        </a:effectStyle>
+      </a:effectStyleLst>
+      <a:bgFillStyleLst>
+        <a:solidFill>
+          <a:schemeClr val="phClr"/>
+        </a:solidFill>
+        <a:solidFill>
+          <a:schemeClr val="phClr">
+            <a:tint val="95000"/>
+            <a:satMod val="170000"/>
+          </a:schemeClr>
+        </a:solidFill>
+        <a:gradFill rotWithShape="1">
+          <a:gsLst>
+            <a:gs pos="0">
+              <a:schemeClr val="phClr">
+                <a:tint val="93000"/>
+                <a:satMod val="150000"/>
+                <a:shade val="98000"/>
+                <a:lumMod val="102000"/>
+              </a:schemeClr>
+            </a:gs>
+            <a:gs pos="50000">
+              <a:schemeClr val="phClr">
+                <a:tint val="98000"/>
+                <a:satMod val="130000"/>
+                <a:shade val="90000"/>
+                <a:lumMod val="103000"/>
+              </a:schemeClr>
+            </a:gs>
+            <a:gs pos="100000">
+              <a:schemeClr val="phClr">
+                <a:shade val="63000"/>
+                <a:satMod val="120000"/>
+              </a:schemeClr>
+            </a:gs>
+          </a:gsLst>
+          <a:lin ang="5400000" scaled="0"/>
+        </a:gradFill>
+      </a:bgFillStyleLst>
+    </a:fmtScheme>
+  </a:themeElements>
+  <a:objectDefaults/>
+  <a:extraClrSchemeLst/>
+  <a:extLst>
+    <a:ext uri="{05A4C25C-085E-4340-85A3-A5531E510DB2}">
+      <thm15:themeFamily xmlns:thm15="http://schemas.microsoft.com/office/thememl/2012/main" name="Office Theme" id="{62F939B6-93AF-4DB8-9C6B-D6C7DFDC589F}" vid="{4A3C46E8-61CC-4603-A589-7422A47A8E4A}"/>
+    </a:ext>
+  </a:extLst>
+</a:theme>
 </file>
</xml_diff>

<commit_message>
Deploying to github_page from @ ShaharSalhov/hangman_game@2452850d2fb8d5c170bfbb3db46aae33f250d436 🚀
</commit_message>
<xml_diff>
--- a/pics/Presentation1.pptx
+++ b/pics/Presentation1.pptx
@@ -5,12 +5,19 @@
     <p:sldMasterId id="2147483648" r:id="rId1"/>
   </p:sldMasterIdLst>
   <p:notesMasterIdLst>
-    <p:notesMasterId r:id="rId5"/>
+    <p:notesMasterId r:id="rId12"/>
   </p:notesMasterIdLst>
   <p:sldIdLst>
-    <p:sldId id="256" r:id="rId2"/>
-    <p:sldId id="257" r:id="rId3"/>
-    <p:sldId id="258" r:id="rId4"/>
+    <p:sldId id="265" r:id="rId2"/>
+    <p:sldId id="256" r:id="rId3"/>
+    <p:sldId id="259" r:id="rId4"/>
+    <p:sldId id="260" r:id="rId5"/>
+    <p:sldId id="261" r:id="rId6"/>
+    <p:sldId id="262" r:id="rId7"/>
+    <p:sldId id="263" r:id="rId8"/>
+    <p:sldId id="264" r:id="rId9"/>
+    <p:sldId id="257" r:id="rId10"/>
+    <p:sldId id="258" r:id="rId11"/>
   </p:sldIdLst>
   <p:sldSz cx="12192000" cy="6858000"/>
   <p:notesSz cx="6858000" cy="9144000"/>
@@ -199,7 +206,7 @@
           <a:p>
             <a:fld id="{00A04D43-7B91-514F-A3C0-7946BB0D94F9}" type="datetimeFigureOut">
               <a:rPr lang="en-IL" smtClean="0"/>
-              <a:t>11/06/2022</a:t>
+              <a:t>17/06/2022</a:t>
             </a:fld>
             <a:endParaRPr lang="en-IL"/>
           </a:p>
@@ -532,7 +539,7 @@
           <a:p>
             <a:fld id="{E3D95403-252C-BA48-9DE1-28AE00E9A926}" type="slidenum">
               <a:rPr lang="en-IL" smtClean="0"/>
-              <a:t>3</a:t>
+              <a:t>10</a:t>
             </a:fld>
             <a:endParaRPr lang="en-IL"/>
           </a:p>
@@ -700,7 +707,7 @@
           <a:p>
             <a:fld id="{D28EEE30-0DFC-B649-9D10-686B575B56EB}" type="datetimeFigureOut">
               <a:rPr lang="en-IL" smtClean="0"/>
-              <a:t>11/06/2022</a:t>
+              <a:t>17/06/2022</a:t>
             </a:fld>
             <a:endParaRPr lang="en-IL"/>
           </a:p>
@@ -900,7 +907,7 @@
           <a:p>
             <a:fld id="{D28EEE30-0DFC-B649-9D10-686B575B56EB}" type="datetimeFigureOut">
               <a:rPr lang="en-IL" smtClean="0"/>
-              <a:t>11/06/2022</a:t>
+              <a:t>17/06/2022</a:t>
             </a:fld>
             <a:endParaRPr lang="en-IL"/>
           </a:p>
@@ -1110,7 +1117,7 @@
           <a:p>
             <a:fld id="{D28EEE30-0DFC-B649-9D10-686B575B56EB}" type="datetimeFigureOut">
               <a:rPr lang="en-IL" smtClean="0"/>
-              <a:t>11/06/2022</a:t>
+              <a:t>17/06/2022</a:t>
             </a:fld>
             <a:endParaRPr lang="en-IL"/>
           </a:p>
@@ -1310,7 +1317,7 @@
           <a:p>
             <a:fld id="{D28EEE30-0DFC-B649-9D10-686B575B56EB}" type="datetimeFigureOut">
               <a:rPr lang="en-IL" smtClean="0"/>
-              <a:t>11/06/2022</a:t>
+              <a:t>17/06/2022</a:t>
             </a:fld>
             <a:endParaRPr lang="en-IL"/>
           </a:p>
@@ -1586,7 +1593,7 @@
           <a:p>
             <a:fld id="{D28EEE30-0DFC-B649-9D10-686B575B56EB}" type="datetimeFigureOut">
               <a:rPr lang="en-IL" smtClean="0"/>
-              <a:t>11/06/2022</a:t>
+              <a:t>17/06/2022</a:t>
             </a:fld>
             <a:endParaRPr lang="en-IL"/>
           </a:p>
@@ -1854,7 +1861,7 @@
           <a:p>
             <a:fld id="{D28EEE30-0DFC-B649-9D10-686B575B56EB}" type="datetimeFigureOut">
               <a:rPr lang="en-IL" smtClean="0"/>
-              <a:t>11/06/2022</a:t>
+              <a:t>17/06/2022</a:t>
             </a:fld>
             <a:endParaRPr lang="en-IL"/>
           </a:p>
@@ -2269,7 +2276,7 @@
           <a:p>
             <a:fld id="{D28EEE30-0DFC-B649-9D10-686B575B56EB}" type="datetimeFigureOut">
               <a:rPr lang="en-IL" smtClean="0"/>
-              <a:t>11/06/2022</a:t>
+              <a:t>17/06/2022</a:t>
             </a:fld>
             <a:endParaRPr lang="en-IL"/>
           </a:p>
@@ -2411,7 +2418,7 @@
           <a:p>
             <a:fld id="{D28EEE30-0DFC-B649-9D10-686B575B56EB}" type="datetimeFigureOut">
               <a:rPr lang="en-IL" smtClean="0"/>
-              <a:t>11/06/2022</a:t>
+              <a:t>17/06/2022</a:t>
             </a:fld>
             <a:endParaRPr lang="en-IL"/>
           </a:p>
@@ -2524,7 +2531,7 @@
           <a:p>
             <a:fld id="{D28EEE30-0DFC-B649-9D10-686B575B56EB}" type="datetimeFigureOut">
               <a:rPr lang="en-IL" smtClean="0"/>
-              <a:t>11/06/2022</a:t>
+              <a:t>17/06/2022</a:t>
             </a:fld>
             <a:endParaRPr lang="en-IL"/>
           </a:p>
@@ -2837,7 +2844,7 @@
           <a:p>
             <a:fld id="{D28EEE30-0DFC-B649-9D10-686B575B56EB}" type="datetimeFigureOut">
               <a:rPr lang="en-IL" smtClean="0"/>
-              <a:t>11/06/2022</a:t>
+              <a:t>17/06/2022</a:t>
             </a:fld>
             <a:endParaRPr lang="en-IL"/>
           </a:p>
@@ -3126,7 +3133,7 @@
           <a:p>
             <a:fld id="{D28EEE30-0DFC-B649-9D10-686B575B56EB}" type="datetimeFigureOut">
               <a:rPr lang="en-IL" smtClean="0"/>
-              <a:t>11/06/2022</a:t>
+              <a:t>17/06/2022</a:t>
             </a:fld>
             <a:endParaRPr lang="en-IL"/>
           </a:p>
@@ -3369,7 +3376,7 @@
           <a:p>
             <a:fld id="{D28EEE30-0DFC-B649-9D10-686B575B56EB}" type="datetimeFigureOut">
               <a:rPr lang="en-IL" smtClean="0"/>
-              <a:t>11/06/2022</a:t>
+              <a:t>17/06/2022</a:t>
             </a:fld>
             <a:endParaRPr lang="en-IL"/>
           </a:p>
@@ -3772,18 +3779,473 @@
 <file path=ppt/slides/slide1.xml><?xml version="1.0" encoding="utf-8"?>
 <p:sld xmlns:a="http://schemas.openxmlformats.org/drawingml/2006/main" xmlns:r="http://schemas.openxmlformats.org/officeDocument/2006/relationships" xmlns:p="http://schemas.openxmlformats.org/presentationml/2006/main">
   <p:cSld>
+    <p:spTree>
+      <p:nvGrpSpPr>
+        <p:cNvPr id="1" name=""/>
+        <p:cNvGrpSpPr/>
+        <p:nvPr/>
+      </p:nvGrpSpPr>
+      <p:grpSpPr>
+        <a:xfrm>
+          <a:off x="0" y="0"/>
+          <a:ext cx="0" cy="0"/>
+          <a:chOff x="0" y="0"/>
+          <a:chExt cx="0" cy="0"/>
+        </a:xfrm>
+      </p:grpSpPr>
+      <p:sp>
+        <p:nvSpPr>
+          <p:cNvPr id="2" name="Title 1">
+            <a:extLst>
+              <a:ext uri="{FF2B5EF4-FFF2-40B4-BE49-F238E27FC236}">
+                <a16:creationId xmlns:a16="http://schemas.microsoft.com/office/drawing/2014/main" id="{64DDCBD7-E891-0FF3-4F2F-7941031AE23C}"/>
+              </a:ext>
+            </a:extLst>
+          </p:cNvPr>
+          <p:cNvSpPr>
+            <a:spLocks noGrp="1"/>
+          </p:cNvSpPr>
+          <p:nvPr>
+            <p:ph type="title"/>
+          </p:nvPr>
+        </p:nvSpPr>
+        <p:spPr/>
+        <p:txBody>
+          <a:bodyPr/>
+          <a:lstStyle/>
+          <a:p>
+            <a:endParaRPr lang="en-IL" dirty="0"/>
+          </a:p>
+        </p:txBody>
+      </p:sp>
+      <p:graphicFrame>
+        <p:nvGraphicFramePr>
+          <p:cNvPr id="10" name="Table 9">
+            <a:extLst>
+              <a:ext uri="{FF2B5EF4-FFF2-40B4-BE49-F238E27FC236}">
+                <a16:creationId xmlns:a16="http://schemas.microsoft.com/office/drawing/2014/main" id="{CECCCF89-E6FE-C021-C3FC-109406E9F7BF}"/>
+              </a:ext>
+            </a:extLst>
+          </p:cNvPr>
+          <p:cNvGraphicFramePr>
+            <a:graphicFrameLocks noGrp="1"/>
+          </p:cNvGraphicFramePr>
+          <p:nvPr/>
+        </p:nvGraphicFramePr>
+        <p:xfrm>
+          <a:off x="3786187" y="3574574"/>
+          <a:ext cx="4619626" cy="853440"/>
+        </p:xfrm>
+        <a:graphic>
+          <a:graphicData uri="http://schemas.openxmlformats.org/drawingml/2006/table">
+            <a:tbl>
+              <a:tblPr/>
+              <a:tblGrid>
+                <a:gridCol w="2309813">
+                  <a:extLst>
+                    <a:ext uri="{9D8B030D-6E8A-4147-A177-3AD203B41FA5}">
+                      <a16:colId xmlns:a16="http://schemas.microsoft.com/office/drawing/2014/main" val="1455265959"/>
+                    </a:ext>
+                  </a:extLst>
+                </a:gridCol>
+                <a:gridCol w="2309813">
+                  <a:extLst>
+                    <a:ext uri="{9D8B030D-6E8A-4147-A177-3AD203B41FA5}">
+                      <a16:colId xmlns:a16="http://schemas.microsoft.com/office/drawing/2014/main" val="827796373"/>
+                    </a:ext>
+                  </a:extLst>
+                </a:gridCol>
+              </a:tblGrid>
+              <a:tr h="0">
+                <a:tc>
+                  <a:txBody>
+                    <a:bodyPr/>
+                    <a:lstStyle/>
+                    <a:p>
+                      <a:pPr fontAlgn="t"/>
+                      <a:r>
+                        <a:rPr lang="en-US" u="none" strike="noStrike">
+                          <a:solidFill>
+                            <a:srgbClr val="1565C0"/>
+                          </a:solidFill>
+                          <a:effectLst/>
+                          <a:hlinkClick r:id="rId2" tooltip="#333b40 color"/>
+                        </a:rPr>
+                        <a:t>#333b40</a:t>
+                      </a:r>
+                      <a:endParaRPr lang="en-US">
+                        <a:effectLst/>
+                      </a:endParaRPr>
+                    </a:p>
+                  </a:txBody>
+                  <a:tcPr marL="76200" marR="76200" marT="76200" marB="76200">
+                    <a:lnL>
+                      <a:noFill/>
+                    </a:lnL>
+                    <a:lnR>
+                      <a:noFill/>
+                    </a:lnR>
+                    <a:lnT w="9525" cap="flat" cmpd="sng" algn="ctr">
+                      <a:solidFill>
+                        <a:srgbClr val="DDDDDD"/>
+                      </a:solidFill>
+                      <a:prstDash val="solid"/>
+                      <a:round/>
+                      <a:headEnd type="none" w="med" len="med"/>
+                      <a:tailEnd type="none" w="med" len="med"/>
+                    </a:lnT>
+                    <a:lnB w="9525" cap="flat" cmpd="sng" algn="ctr">
+                      <a:solidFill>
+                        <a:srgbClr val="DDDDDD"/>
+                      </a:solidFill>
+                      <a:prstDash val="solid"/>
+                      <a:round/>
+                      <a:headEnd type="none" w="med" len="med"/>
+                      <a:tailEnd type="none" w="med" len="med"/>
+                    </a:lnB>
+                    <a:solidFill>
+                      <a:srgbClr val="FFFFFF"/>
+                    </a:solidFill>
+                  </a:tcPr>
+                </a:tc>
+                <a:tc>
+                  <a:txBody>
+                    <a:bodyPr/>
+                    <a:lstStyle/>
+                    <a:p>
+                      <a:pPr fontAlgn="t"/>
+                      <a:r>
+                        <a:rPr lang="en-IL">
+                          <a:effectLst/>
+                        </a:rPr>
+                        <a:t>(51,59,64)</a:t>
+                      </a:r>
+                    </a:p>
+                  </a:txBody>
+                  <a:tcPr marL="76200" marR="76200" marT="76200" marB="76200">
+                    <a:lnL>
+                      <a:noFill/>
+                    </a:lnL>
+                    <a:lnR>
+                      <a:noFill/>
+                    </a:lnR>
+                    <a:lnT w="9525" cap="flat" cmpd="sng" algn="ctr">
+                      <a:solidFill>
+                        <a:srgbClr val="DDDDDD"/>
+                      </a:solidFill>
+                      <a:prstDash val="solid"/>
+                      <a:round/>
+                      <a:headEnd type="none" w="med" len="med"/>
+                      <a:tailEnd type="none" w="med" len="med"/>
+                    </a:lnT>
+                    <a:lnB w="9525" cap="flat" cmpd="sng" algn="ctr">
+                      <a:solidFill>
+                        <a:srgbClr val="DDDDDD"/>
+                      </a:solidFill>
+                      <a:prstDash val="solid"/>
+                      <a:round/>
+                      <a:headEnd type="none" w="med" len="med"/>
+                      <a:tailEnd type="none" w="med" len="med"/>
+                    </a:lnB>
+                    <a:solidFill>
+                      <a:srgbClr val="FFFFFF"/>
+                    </a:solidFill>
+                  </a:tcPr>
+                </a:tc>
+                <a:extLst>
+                  <a:ext uri="{0D108BD9-81ED-4DB2-BD59-A6C34878D82A}">
+                    <a16:rowId xmlns:a16="http://schemas.microsoft.com/office/drawing/2014/main" val="2904946300"/>
+                  </a:ext>
+                </a:extLst>
+              </a:tr>
+              <a:tr h="0">
+                <a:tc>
+                  <a:txBody>
+                    <a:bodyPr/>
+                    <a:lstStyle/>
+                    <a:p>
+                      <a:pPr fontAlgn="t"/>
+                      <a:endParaRPr lang="en-IL">
+                        <a:effectLst/>
+                      </a:endParaRPr>
+                    </a:p>
+                  </a:txBody>
+                  <a:tcPr marL="76200" marR="76200" marT="76200" marB="76200">
+                    <a:lnL>
+                      <a:noFill/>
+                    </a:lnL>
+                    <a:lnR>
+                      <a:noFill/>
+                    </a:lnR>
+                    <a:lnT w="9525" cap="flat" cmpd="sng" algn="ctr">
+                      <a:solidFill>
+                        <a:srgbClr val="DDDDDD"/>
+                      </a:solidFill>
+                      <a:prstDash val="solid"/>
+                      <a:round/>
+                      <a:headEnd type="none" w="med" len="med"/>
+                      <a:tailEnd type="none" w="med" len="med"/>
+                    </a:lnT>
+                    <a:lnB>
+                      <a:noFill/>
+                    </a:lnB>
+                    <a:solidFill>
+                      <a:srgbClr val="D4A0A0"/>
+                    </a:solidFill>
+                  </a:tcPr>
+                </a:tc>
+                <a:tc>
+                  <a:txBody>
+                    <a:bodyPr/>
+                    <a:lstStyle/>
+                    <a:p>
+                      <a:pPr fontAlgn="t"/>
+                      <a:r>
+                        <a:rPr lang="en-US" u="none" strike="noStrike" dirty="0">
+                          <a:solidFill>
+                            <a:srgbClr val="1565C0"/>
+                          </a:solidFill>
+                          <a:effectLst/>
+                          <a:hlinkClick r:id="rId3" tooltip="#d4a0a0 color"/>
+                        </a:rPr>
+                        <a:t>#d4a0a0</a:t>
+                      </a:r>
+                      <a:endParaRPr lang="en-US" dirty="0">
+                        <a:effectLst/>
+                      </a:endParaRPr>
+                    </a:p>
+                  </a:txBody>
+                  <a:tcPr marL="76200" marR="76200" marT="76200" marB="76200">
+                    <a:lnL>
+                      <a:noFill/>
+                    </a:lnL>
+                    <a:lnR>
+                      <a:noFill/>
+                    </a:lnR>
+                    <a:lnT w="9525" cap="flat" cmpd="sng" algn="ctr">
+                      <a:solidFill>
+                        <a:srgbClr val="DDDDDD"/>
+                      </a:solidFill>
+                      <a:prstDash val="solid"/>
+                      <a:round/>
+                      <a:headEnd type="none" w="med" len="med"/>
+                      <a:tailEnd type="none" w="med" len="med"/>
+                    </a:lnT>
+                    <a:lnB>
+                      <a:noFill/>
+                    </a:lnB>
+                    <a:solidFill>
+                      <a:srgbClr val="FFFFFF"/>
+                    </a:solidFill>
+                  </a:tcPr>
+                </a:tc>
+                <a:extLst>
+                  <a:ext uri="{0D108BD9-81ED-4DB2-BD59-A6C34878D82A}">
+                    <a16:rowId xmlns:a16="http://schemas.microsoft.com/office/drawing/2014/main" val="1873310207"/>
+                  </a:ext>
+                </a:extLst>
+              </a:tr>
+            </a:tbl>
+          </a:graphicData>
+        </a:graphic>
+      </p:graphicFrame>
+    </p:spTree>
+    <p:extLst>
+      <p:ext uri="{BB962C8B-B14F-4D97-AF65-F5344CB8AC3E}">
+        <p14:creationId xmlns:p14="http://schemas.microsoft.com/office/powerpoint/2010/main" val="1790299634"/>
+      </p:ext>
+    </p:extLst>
+  </p:cSld>
+  <p:clrMapOvr>
+    <a:masterClrMapping/>
+  </p:clrMapOvr>
+</p:sld>
+</file>
+
+<file path=ppt/slides/slide10.xml><?xml version="1.0" encoding="utf-8"?>
+<p:sld xmlns:a="http://schemas.openxmlformats.org/drawingml/2006/main" xmlns:r="http://schemas.openxmlformats.org/officeDocument/2006/relationships" xmlns:p="http://schemas.openxmlformats.org/presentationml/2006/main">
+  <p:cSld>
     <p:bg>
       <p:bgPr>
-        <a:blipFill dpi="0" rotWithShape="1">
-          <a:blip r:embed="rId2">
-            <a:alphaModFix amt="13787"/>
-            <a:lum/>
-          </a:blip>
-          <a:srcRect/>
-          <a:stretch>
-            <a:fillRect t="-69000" b="-69000"/>
-          </a:stretch>
-        </a:blipFill>
+        <a:solidFill>
+          <a:srgbClr val="086E3B"/>
+        </a:solidFill>
+        <a:effectLst/>
+      </p:bgPr>
+    </p:bg>
+    <p:spTree>
+      <p:nvGrpSpPr>
+        <p:cNvPr id="1" name=""/>
+        <p:cNvGrpSpPr/>
+        <p:nvPr/>
+      </p:nvGrpSpPr>
+      <p:grpSpPr>
+        <a:xfrm>
+          <a:off x="0" y="0"/>
+          <a:ext cx="0" cy="0"/>
+          <a:chOff x="0" y="0"/>
+          <a:chExt cx="0" cy="0"/>
+        </a:xfrm>
+      </p:grpSpPr>
+      <p:sp>
+        <p:nvSpPr>
+          <p:cNvPr id="4" name="Rectangle 3">
+            <a:extLst>
+              <a:ext uri="{FF2B5EF4-FFF2-40B4-BE49-F238E27FC236}">
+                <a16:creationId xmlns:a16="http://schemas.microsoft.com/office/drawing/2014/main" id="{19C33F28-3D07-8712-0C19-6679577B3F89}"/>
+              </a:ext>
+            </a:extLst>
+          </p:cNvPr>
+          <p:cNvSpPr/>
+          <p:nvPr/>
+        </p:nvSpPr>
+        <p:spPr>
+          <a:xfrm>
+            <a:off x="0" y="-1"/>
+            <a:ext cx="12192000" cy="5770593"/>
+          </a:xfrm>
+          <a:prstGeom prst="rect">
+            <a:avLst/>
+          </a:prstGeom>
+          <a:noFill/>
+          <a:ln w="114300">
+            <a:solidFill>
+              <a:srgbClr val="6B3815"/>
+            </a:solidFill>
+          </a:ln>
+        </p:spPr>
+        <p:style>
+          <a:lnRef idx="2">
+            <a:schemeClr val="accent1">
+              <a:shade val="50000"/>
+            </a:schemeClr>
+          </a:lnRef>
+          <a:fillRef idx="1">
+            <a:schemeClr val="accent1"/>
+          </a:fillRef>
+          <a:effectRef idx="0">
+            <a:schemeClr val="accent1"/>
+          </a:effectRef>
+          <a:fontRef idx="minor">
+            <a:schemeClr val="lt1"/>
+          </a:fontRef>
+        </p:style>
+        <p:txBody>
+          <a:bodyPr rtlCol="0" anchor="ctr"/>
+          <a:lstStyle/>
+          <a:p>
+            <a:pPr algn="ctr"/>
+            <a:endParaRPr lang="en-IL" dirty="0"/>
+          </a:p>
+        </p:txBody>
+      </p:sp>
+      <p:cxnSp>
+        <p:nvCxnSpPr>
+          <p:cNvPr id="6" name="Straight Connector 5">
+            <a:extLst>
+              <a:ext uri="{FF2B5EF4-FFF2-40B4-BE49-F238E27FC236}">
+                <a16:creationId xmlns:a16="http://schemas.microsoft.com/office/drawing/2014/main" id="{ED0D8D8E-40D0-7AD6-F5CC-9EA6E0B213FA}"/>
+              </a:ext>
+            </a:extLst>
+          </p:cNvPr>
+          <p:cNvCxnSpPr>
+            <a:cxnSpLocks/>
+          </p:cNvCxnSpPr>
+          <p:nvPr/>
+        </p:nvCxnSpPr>
+        <p:spPr>
+          <a:xfrm>
+            <a:off x="55959" y="5653624"/>
+            <a:ext cx="12080081" cy="0"/>
+          </a:xfrm>
+          <a:prstGeom prst="line">
+            <a:avLst/>
+          </a:prstGeom>
+          <a:ln w="130175">
+            <a:solidFill>
+              <a:srgbClr val="854E2A"/>
+            </a:solidFill>
+          </a:ln>
+        </p:spPr>
+        <p:style>
+          <a:lnRef idx="1">
+            <a:schemeClr val="accent1"/>
+          </a:lnRef>
+          <a:fillRef idx="0">
+            <a:schemeClr val="accent1"/>
+          </a:fillRef>
+          <a:effectRef idx="0">
+            <a:schemeClr val="accent1"/>
+          </a:effectRef>
+          <a:fontRef idx="minor">
+            <a:schemeClr val="tx1"/>
+          </a:fontRef>
+        </p:style>
+      </p:cxnSp>
+      <p:cxnSp>
+        <p:nvCxnSpPr>
+          <p:cNvPr id="12" name="Straight Connector 11">
+            <a:extLst>
+              <a:ext uri="{FF2B5EF4-FFF2-40B4-BE49-F238E27FC236}">
+                <a16:creationId xmlns:a16="http://schemas.microsoft.com/office/drawing/2014/main" id="{CE1768C1-6CBB-0D43-2A7C-ADA758938813}"/>
+              </a:ext>
+            </a:extLst>
+          </p:cNvPr>
+          <p:cNvCxnSpPr>
+            <a:cxnSpLocks/>
+          </p:cNvCxnSpPr>
+          <p:nvPr/>
+        </p:nvCxnSpPr>
+        <p:spPr>
+          <a:xfrm>
+            <a:off x="-57666" y="5885108"/>
+            <a:ext cx="12344401" cy="0"/>
+          </a:xfrm>
+          <a:prstGeom prst="line">
+            <a:avLst/>
+          </a:prstGeom>
+          <a:ln w="130175">
+            <a:solidFill>
+              <a:schemeClr val="tx1"/>
+            </a:solidFill>
+          </a:ln>
+        </p:spPr>
+        <p:style>
+          <a:lnRef idx="1">
+            <a:schemeClr val="accent1"/>
+          </a:lnRef>
+          <a:fillRef idx="0">
+            <a:schemeClr val="accent1"/>
+          </a:fillRef>
+          <a:effectRef idx="0">
+            <a:schemeClr val="accent1"/>
+          </a:effectRef>
+          <a:fontRef idx="minor">
+            <a:schemeClr val="tx1"/>
+          </a:fontRef>
+        </p:style>
+      </p:cxnSp>
+    </p:spTree>
+    <p:extLst>
+      <p:ext uri="{BB962C8B-B14F-4D97-AF65-F5344CB8AC3E}">
+        <p14:creationId xmlns:p14="http://schemas.microsoft.com/office/powerpoint/2010/main" val="381717333"/>
+      </p:ext>
+    </p:extLst>
+  </p:cSld>
+  <p:clrMapOvr>
+    <a:masterClrMapping/>
+  </p:clrMapOvr>
+</p:sld>
+</file>
+
+<file path=ppt/slides/slide2.xml><?xml version="1.0" encoding="utf-8"?>
+<p:sld xmlns:a="http://schemas.openxmlformats.org/drawingml/2006/main" xmlns:r="http://schemas.openxmlformats.org/officeDocument/2006/relationships" xmlns:p="http://schemas.openxmlformats.org/presentationml/2006/main">
+  <p:cSld>
+    <p:bg>
+      <p:bgPr>
+        <a:solidFill>
+          <a:srgbClr val="D4A0A0"/>
+        </a:solidFill>
         <a:effectLst/>
       </p:bgPr>
     </p:bg>
@@ -3817,15 +4279,15 @@
         </p:nvCxnSpPr>
         <p:spPr>
           <a:xfrm>
-            <a:off x="1565564" y="6137561"/>
+            <a:off x="1552501" y="6124498"/>
             <a:ext cx="2161309" cy="0"/>
           </a:xfrm>
           <a:prstGeom prst="line">
             <a:avLst/>
           </a:prstGeom>
-          <a:ln w="63500">
+          <a:ln w="104775">
             <a:solidFill>
-              <a:schemeClr val="tx1"/>
+              <a:srgbClr val="333B40"/>
             </a:solidFill>
           </a:ln>
         </p:spPr>
@@ -3866,9 +4328,9 @@
           <a:prstGeom prst="line">
             <a:avLst/>
           </a:prstGeom>
-          <a:ln w="63500">
+          <a:ln w="104775">
             <a:solidFill>
-              <a:schemeClr val="tx1"/>
+              <a:srgbClr val="333B40"/>
             </a:solidFill>
           </a:ln>
         </p:spPr>
@@ -3903,15 +4365,15 @@
         </p:nvCxnSpPr>
         <p:spPr>
           <a:xfrm>
-            <a:off x="1579419" y="872836"/>
+            <a:off x="1605545" y="859773"/>
             <a:ext cx="0" cy="5278581"/>
           </a:xfrm>
           <a:prstGeom prst="line">
             <a:avLst/>
           </a:prstGeom>
-          <a:ln w="63500">
+          <a:ln w="104775">
             <a:solidFill>
-              <a:schemeClr val="tx1"/>
+              <a:srgbClr val="333B40"/>
             </a:solidFill>
           </a:ln>
         </p:spPr>
@@ -3999,276 +4461,9 @@
           <a:prstGeom prst="line">
             <a:avLst/>
           </a:prstGeom>
-          <a:ln w="63500">
+          <a:ln w="104775">
             <a:solidFill>
-              <a:schemeClr val="tx1"/>
-            </a:solidFill>
-          </a:ln>
-        </p:spPr>
-        <p:style>
-          <a:lnRef idx="1">
-            <a:schemeClr val="accent1"/>
-          </a:lnRef>
-          <a:fillRef idx="0">
-            <a:schemeClr val="accent1"/>
-          </a:fillRef>
-          <a:effectRef idx="0">
-            <a:schemeClr val="accent1"/>
-          </a:effectRef>
-          <a:fontRef idx="minor">
-            <a:schemeClr val="tx1"/>
-          </a:fontRef>
-        </p:style>
-      </p:cxnSp>
-      <p:sp>
-        <p:nvSpPr>
-          <p:cNvPr id="17" name="Oval 16">
-            <a:extLst>
-              <a:ext uri="{FF2B5EF4-FFF2-40B4-BE49-F238E27FC236}">
-                <a16:creationId xmlns:a16="http://schemas.microsoft.com/office/drawing/2014/main" id="{54357F0B-BE38-2A7E-C039-215E3F2E868E}"/>
-              </a:ext>
-            </a:extLst>
-          </p:cNvPr>
-          <p:cNvSpPr/>
-          <p:nvPr/>
-        </p:nvSpPr>
-        <p:spPr>
-          <a:xfrm>
-            <a:off x="2899710" y="1455336"/>
-            <a:ext cx="1014884" cy="1004835"/>
-          </a:xfrm>
-          <a:prstGeom prst="ellipse">
-            <a:avLst/>
-          </a:prstGeom>
-          <a:noFill/>
-          <a:ln w="63500">
-            <a:solidFill>
-              <a:schemeClr val="tx1"/>
-            </a:solidFill>
-          </a:ln>
-        </p:spPr>
-        <p:style>
-          <a:lnRef idx="2">
-            <a:schemeClr val="accent1">
-              <a:shade val="50000"/>
-            </a:schemeClr>
-          </a:lnRef>
-          <a:fillRef idx="1">
-            <a:schemeClr val="accent1"/>
-          </a:fillRef>
-          <a:effectRef idx="0">
-            <a:schemeClr val="accent1"/>
-          </a:effectRef>
-          <a:fontRef idx="minor">
-            <a:schemeClr val="lt1"/>
-          </a:fontRef>
-        </p:style>
-        <p:txBody>
-          <a:bodyPr rtlCol="0" anchor="ctr"/>
-          <a:lstStyle/>
-          <a:p>
-            <a:pPr algn="ctr"/>
-            <a:endParaRPr lang="en-IL" dirty="0"/>
-          </a:p>
-        </p:txBody>
-      </p:sp>
-      <p:cxnSp>
-        <p:nvCxnSpPr>
-          <p:cNvPr id="18" name="Straight Connector 17">
-            <a:extLst>
-              <a:ext uri="{FF2B5EF4-FFF2-40B4-BE49-F238E27FC236}">
-                <a16:creationId xmlns:a16="http://schemas.microsoft.com/office/drawing/2014/main" id="{F05F4C2D-87F3-58B6-882D-2C5BC533F090}"/>
-              </a:ext>
-            </a:extLst>
-          </p:cNvPr>
-          <p:cNvCxnSpPr>
-            <a:cxnSpLocks/>
-          </p:cNvCxnSpPr>
-          <p:nvPr/>
-        </p:nvCxnSpPr>
-        <p:spPr>
-          <a:xfrm flipV="1">
-            <a:off x="3407152" y="2427892"/>
-            <a:ext cx="0" cy="1983334"/>
-          </a:xfrm>
-          <a:prstGeom prst="line">
-            <a:avLst/>
-          </a:prstGeom>
-          <a:ln w="63500">
-            <a:solidFill>
-              <a:schemeClr val="tx1"/>
-            </a:solidFill>
-          </a:ln>
-        </p:spPr>
-        <p:style>
-          <a:lnRef idx="1">
-            <a:schemeClr val="accent1"/>
-          </a:lnRef>
-          <a:fillRef idx="0">
-            <a:schemeClr val="accent1"/>
-          </a:fillRef>
-          <a:effectRef idx="0">
-            <a:schemeClr val="accent1"/>
-          </a:effectRef>
-          <a:fontRef idx="minor">
-            <a:schemeClr val="tx1"/>
-          </a:fontRef>
-        </p:style>
-      </p:cxnSp>
-      <p:cxnSp>
-        <p:nvCxnSpPr>
-          <p:cNvPr id="20" name="Straight Connector 19">
-            <a:extLst>
-              <a:ext uri="{FF2B5EF4-FFF2-40B4-BE49-F238E27FC236}">
-                <a16:creationId xmlns:a16="http://schemas.microsoft.com/office/drawing/2014/main" id="{25526115-DA94-4D06-E712-487C6A12655F}"/>
-              </a:ext>
-            </a:extLst>
-          </p:cNvPr>
-          <p:cNvCxnSpPr>
-            <a:cxnSpLocks/>
-          </p:cNvCxnSpPr>
-          <p:nvPr/>
-        </p:nvCxnSpPr>
-        <p:spPr>
-          <a:xfrm flipH="1" flipV="1">
-            <a:off x="3415145" y="2783393"/>
-            <a:ext cx="499449" cy="371294"/>
-          </a:xfrm>
-          <a:prstGeom prst="line">
-            <a:avLst/>
-          </a:prstGeom>
-          <a:ln w="63500">
-            <a:solidFill>
-              <a:schemeClr val="tx1"/>
-            </a:solidFill>
-          </a:ln>
-        </p:spPr>
-        <p:style>
-          <a:lnRef idx="1">
-            <a:schemeClr val="accent1"/>
-          </a:lnRef>
-          <a:fillRef idx="0">
-            <a:schemeClr val="accent1"/>
-          </a:fillRef>
-          <a:effectRef idx="0">
-            <a:schemeClr val="accent1"/>
-          </a:effectRef>
-          <a:fontRef idx="minor">
-            <a:schemeClr val="tx1"/>
-          </a:fontRef>
-        </p:style>
-      </p:cxnSp>
-      <p:cxnSp>
-        <p:nvCxnSpPr>
-          <p:cNvPr id="23" name="Straight Connector 22">
-            <a:extLst>
-              <a:ext uri="{FF2B5EF4-FFF2-40B4-BE49-F238E27FC236}">
-                <a16:creationId xmlns:a16="http://schemas.microsoft.com/office/drawing/2014/main" id="{4393BC4A-8E55-98A9-6827-2EF9E6B6717F}"/>
-              </a:ext>
-            </a:extLst>
-          </p:cNvPr>
-          <p:cNvCxnSpPr>
-            <a:cxnSpLocks/>
-          </p:cNvCxnSpPr>
-          <p:nvPr/>
-        </p:nvCxnSpPr>
-        <p:spPr>
-          <a:xfrm flipV="1">
-            <a:off x="2921539" y="2783393"/>
-            <a:ext cx="463785" cy="386691"/>
-          </a:xfrm>
-          <a:prstGeom prst="line">
-            <a:avLst/>
-          </a:prstGeom>
-          <a:ln w="63500">
-            <a:solidFill>
-              <a:schemeClr val="tx1"/>
-            </a:solidFill>
-          </a:ln>
-        </p:spPr>
-        <p:style>
-          <a:lnRef idx="1">
-            <a:schemeClr val="accent1"/>
-          </a:lnRef>
-          <a:fillRef idx="0">
-            <a:schemeClr val="accent1"/>
-          </a:fillRef>
-          <a:effectRef idx="0">
-            <a:schemeClr val="accent1"/>
-          </a:effectRef>
-          <a:fontRef idx="minor">
-            <a:schemeClr val="tx1"/>
-          </a:fontRef>
-        </p:style>
-      </p:cxnSp>
-      <p:cxnSp>
-        <p:nvCxnSpPr>
-          <p:cNvPr id="26" name="Straight Connector 25">
-            <a:extLst>
-              <a:ext uri="{FF2B5EF4-FFF2-40B4-BE49-F238E27FC236}">
-                <a16:creationId xmlns:a16="http://schemas.microsoft.com/office/drawing/2014/main" id="{A84AD84C-6F98-87E5-91BA-9E6B8A2BAA54}"/>
-              </a:ext>
-            </a:extLst>
-          </p:cNvPr>
-          <p:cNvCxnSpPr>
-            <a:cxnSpLocks/>
-          </p:cNvCxnSpPr>
-          <p:nvPr/>
-        </p:nvCxnSpPr>
-        <p:spPr>
-          <a:xfrm flipH="1" flipV="1">
-            <a:off x="3400833" y="4392290"/>
-            <a:ext cx="499449" cy="371294"/>
-          </a:xfrm>
-          <a:prstGeom prst="line">
-            <a:avLst/>
-          </a:prstGeom>
-          <a:ln w="63500">
-            <a:solidFill>
-              <a:schemeClr val="tx1"/>
-            </a:solidFill>
-          </a:ln>
-        </p:spPr>
-        <p:style>
-          <a:lnRef idx="1">
-            <a:schemeClr val="accent1"/>
-          </a:lnRef>
-          <a:fillRef idx="0">
-            <a:schemeClr val="accent1"/>
-          </a:fillRef>
-          <a:effectRef idx="0">
-            <a:schemeClr val="accent1"/>
-          </a:effectRef>
-          <a:fontRef idx="minor">
-            <a:schemeClr val="tx1"/>
-          </a:fontRef>
-        </p:style>
-      </p:cxnSp>
-      <p:cxnSp>
-        <p:nvCxnSpPr>
-          <p:cNvPr id="27" name="Straight Connector 26">
-            <a:extLst>
-              <a:ext uri="{FF2B5EF4-FFF2-40B4-BE49-F238E27FC236}">
-                <a16:creationId xmlns:a16="http://schemas.microsoft.com/office/drawing/2014/main" id="{62A2F672-D327-3C46-99BC-187E8D765C5C}"/>
-              </a:ext>
-            </a:extLst>
-          </p:cNvPr>
-          <p:cNvCxnSpPr>
-            <a:cxnSpLocks/>
-          </p:cNvCxnSpPr>
-          <p:nvPr/>
-        </p:nvCxnSpPr>
-        <p:spPr>
-          <a:xfrm flipV="1">
-            <a:off x="2943599" y="4407687"/>
-            <a:ext cx="463785" cy="386691"/>
-          </a:xfrm>
-          <a:prstGeom prst="line">
-            <a:avLst/>
-          </a:prstGeom>
-          <a:ln w="63500">
-            <a:solidFill>
-              <a:schemeClr val="tx1"/>
+              <a:srgbClr val="333B40"/>
             </a:solidFill>
           </a:ln>
         </p:spPr>
@@ -4300,7 +4495,2488 @@
 </p:sld>
 </file>
 
-<file path=ppt/slides/slide2.xml><?xml version="1.0" encoding="utf-8"?>
+<file path=ppt/slides/slide3.xml><?xml version="1.0" encoding="utf-8"?>
+<p:sld xmlns:a="http://schemas.openxmlformats.org/drawingml/2006/main" xmlns:r="http://schemas.openxmlformats.org/officeDocument/2006/relationships" xmlns:p="http://schemas.openxmlformats.org/presentationml/2006/main">
+  <p:cSld>
+    <p:bg>
+      <p:bgPr>
+        <a:solidFill>
+          <a:srgbClr val="D4A0A0"/>
+        </a:solidFill>
+        <a:effectLst/>
+      </p:bgPr>
+    </p:bg>
+    <p:spTree>
+      <p:nvGrpSpPr>
+        <p:cNvPr id="1" name=""/>
+        <p:cNvGrpSpPr/>
+        <p:nvPr/>
+      </p:nvGrpSpPr>
+      <p:grpSpPr>
+        <a:xfrm>
+          <a:off x="0" y="0"/>
+          <a:ext cx="0" cy="0"/>
+          <a:chOff x="0" y="0"/>
+          <a:chExt cx="0" cy="0"/>
+        </a:xfrm>
+      </p:grpSpPr>
+      <p:cxnSp>
+        <p:nvCxnSpPr>
+          <p:cNvPr id="5" name="Straight Connector 4">
+            <a:extLst>
+              <a:ext uri="{FF2B5EF4-FFF2-40B4-BE49-F238E27FC236}">
+                <a16:creationId xmlns:a16="http://schemas.microsoft.com/office/drawing/2014/main" id="{3FDF4A82-C3AE-952C-FADC-65A06B61533C}"/>
+              </a:ext>
+            </a:extLst>
+          </p:cNvPr>
+          <p:cNvCxnSpPr>
+            <a:cxnSpLocks/>
+          </p:cNvCxnSpPr>
+          <p:nvPr/>
+        </p:nvCxnSpPr>
+        <p:spPr>
+          <a:xfrm>
+            <a:off x="1552501" y="6124498"/>
+            <a:ext cx="2161309" cy="0"/>
+          </a:xfrm>
+          <a:prstGeom prst="line">
+            <a:avLst/>
+          </a:prstGeom>
+          <a:ln w="104775">
+            <a:solidFill>
+              <a:srgbClr val="333B40"/>
+            </a:solidFill>
+          </a:ln>
+        </p:spPr>
+        <p:style>
+          <a:lnRef idx="1">
+            <a:schemeClr val="accent1"/>
+          </a:lnRef>
+          <a:fillRef idx="0">
+            <a:schemeClr val="accent1"/>
+          </a:fillRef>
+          <a:effectRef idx="0">
+            <a:schemeClr val="accent1"/>
+          </a:effectRef>
+          <a:fontRef idx="minor">
+            <a:schemeClr val="tx1"/>
+          </a:fontRef>
+        </p:style>
+      </p:cxnSp>
+      <p:cxnSp>
+        <p:nvCxnSpPr>
+          <p:cNvPr id="7" name="Straight Connector 6">
+            <a:extLst>
+              <a:ext uri="{FF2B5EF4-FFF2-40B4-BE49-F238E27FC236}">
+                <a16:creationId xmlns:a16="http://schemas.microsoft.com/office/drawing/2014/main" id="{576CED8E-4AF9-1EB6-F697-55398934A34E}"/>
+              </a:ext>
+            </a:extLst>
+          </p:cNvPr>
+          <p:cNvCxnSpPr>
+            <a:cxnSpLocks/>
+          </p:cNvCxnSpPr>
+          <p:nvPr/>
+        </p:nvCxnSpPr>
+        <p:spPr>
+          <a:xfrm>
+            <a:off x="1565564" y="900546"/>
+            <a:ext cx="3588327" cy="0"/>
+          </a:xfrm>
+          <a:prstGeom prst="line">
+            <a:avLst/>
+          </a:prstGeom>
+          <a:ln w="104775">
+            <a:solidFill>
+              <a:srgbClr val="333B40"/>
+            </a:solidFill>
+          </a:ln>
+        </p:spPr>
+        <p:style>
+          <a:lnRef idx="1">
+            <a:schemeClr val="accent1"/>
+          </a:lnRef>
+          <a:fillRef idx="0">
+            <a:schemeClr val="accent1"/>
+          </a:fillRef>
+          <a:effectRef idx="0">
+            <a:schemeClr val="accent1"/>
+          </a:effectRef>
+          <a:fontRef idx="minor">
+            <a:schemeClr val="tx1"/>
+          </a:fontRef>
+        </p:style>
+      </p:cxnSp>
+      <p:cxnSp>
+        <p:nvCxnSpPr>
+          <p:cNvPr id="9" name="Straight Connector 8">
+            <a:extLst>
+              <a:ext uri="{FF2B5EF4-FFF2-40B4-BE49-F238E27FC236}">
+                <a16:creationId xmlns:a16="http://schemas.microsoft.com/office/drawing/2014/main" id="{27082477-E756-3989-E13C-DB0A5EE19833}"/>
+              </a:ext>
+            </a:extLst>
+          </p:cNvPr>
+          <p:cNvCxnSpPr>
+            <a:cxnSpLocks/>
+          </p:cNvCxnSpPr>
+          <p:nvPr/>
+        </p:nvCxnSpPr>
+        <p:spPr>
+          <a:xfrm>
+            <a:off x="1605545" y="846710"/>
+            <a:ext cx="0" cy="5278581"/>
+          </a:xfrm>
+          <a:prstGeom prst="line">
+            <a:avLst/>
+          </a:prstGeom>
+          <a:ln w="104775">
+            <a:solidFill>
+              <a:srgbClr val="333B40"/>
+            </a:solidFill>
+          </a:ln>
+        </p:spPr>
+        <p:style>
+          <a:lnRef idx="1">
+            <a:schemeClr val="accent1"/>
+          </a:lnRef>
+          <a:fillRef idx="0">
+            <a:schemeClr val="accent1"/>
+          </a:fillRef>
+          <a:effectRef idx="0">
+            <a:schemeClr val="accent1"/>
+          </a:effectRef>
+          <a:fontRef idx="minor">
+            <a:schemeClr val="tx1"/>
+          </a:fontRef>
+        </p:style>
+      </p:cxnSp>
+      <p:sp>
+        <p:nvSpPr>
+          <p:cNvPr id="14" name="Rectangle 13">
+            <a:extLst>
+              <a:ext uri="{FF2B5EF4-FFF2-40B4-BE49-F238E27FC236}">
+                <a16:creationId xmlns:a16="http://schemas.microsoft.com/office/drawing/2014/main" id="{6EE72D93-98B5-F453-B8E4-23313C8E9FFF}"/>
+              </a:ext>
+            </a:extLst>
+          </p:cNvPr>
+          <p:cNvSpPr/>
+          <p:nvPr/>
+        </p:nvSpPr>
+        <p:spPr>
+          <a:xfrm>
+            <a:off x="-110836" y="-124691"/>
+            <a:ext cx="7051963" cy="7107382"/>
+          </a:xfrm>
+          <a:prstGeom prst="rect">
+            <a:avLst/>
+          </a:prstGeom>
+          <a:noFill/>
+        </p:spPr>
+        <p:style>
+          <a:lnRef idx="2">
+            <a:schemeClr val="accent1">
+              <a:shade val="50000"/>
+            </a:schemeClr>
+          </a:lnRef>
+          <a:fillRef idx="1">
+            <a:schemeClr val="accent1"/>
+          </a:fillRef>
+          <a:effectRef idx="0">
+            <a:schemeClr val="accent1"/>
+          </a:effectRef>
+          <a:fontRef idx="minor">
+            <a:schemeClr val="lt1"/>
+          </a:fontRef>
+        </p:style>
+        <p:txBody>
+          <a:bodyPr rtlCol="0" anchor="ctr"/>
+          <a:lstStyle/>
+          <a:p>
+            <a:pPr algn="ctr"/>
+            <a:endParaRPr lang="en-IL" dirty="0"/>
+          </a:p>
+        </p:txBody>
+      </p:sp>
+      <p:cxnSp>
+        <p:nvCxnSpPr>
+          <p:cNvPr id="15" name="Straight Connector 14">
+            <a:extLst>
+              <a:ext uri="{FF2B5EF4-FFF2-40B4-BE49-F238E27FC236}">
+                <a16:creationId xmlns:a16="http://schemas.microsoft.com/office/drawing/2014/main" id="{515AC805-0CB2-1961-39F9-71E8D685EC3D}"/>
+              </a:ext>
+            </a:extLst>
+          </p:cNvPr>
+          <p:cNvCxnSpPr>
+            <a:cxnSpLocks/>
+          </p:cNvCxnSpPr>
+          <p:nvPr/>
+        </p:nvCxnSpPr>
+        <p:spPr>
+          <a:xfrm flipV="1">
+            <a:off x="3407152" y="900546"/>
+            <a:ext cx="0" cy="554790"/>
+          </a:xfrm>
+          <a:prstGeom prst="line">
+            <a:avLst/>
+          </a:prstGeom>
+          <a:ln w="104775">
+            <a:solidFill>
+              <a:srgbClr val="333B40"/>
+            </a:solidFill>
+          </a:ln>
+        </p:spPr>
+        <p:style>
+          <a:lnRef idx="1">
+            <a:schemeClr val="accent1"/>
+          </a:lnRef>
+          <a:fillRef idx="0">
+            <a:schemeClr val="accent1"/>
+          </a:fillRef>
+          <a:effectRef idx="0">
+            <a:schemeClr val="accent1"/>
+          </a:effectRef>
+          <a:fontRef idx="minor">
+            <a:schemeClr val="tx1"/>
+          </a:fontRef>
+        </p:style>
+      </p:cxnSp>
+      <p:sp>
+        <p:nvSpPr>
+          <p:cNvPr id="17" name="Oval 16">
+            <a:extLst>
+              <a:ext uri="{FF2B5EF4-FFF2-40B4-BE49-F238E27FC236}">
+                <a16:creationId xmlns:a16="http://schemas.microsoft.com/office/drawing/2014/main" id="{54357F0B-BE38-2A7E-C039-215E3F2E868E}"/>
+              </a:ext>
+            </a:extLst>
+          </p:cNvPr>
+          <p:cNvSpPr/>
+          <p:nvPr/>
+        </p:nvSpPr>
+        <p:spPr>
+          <a:xfrm>
+            <a:off x="2899710" y="1455336"/>
+            <a:ext cx="1014884" cy="1004835"/>
+          </a:xfrm>
+          <a:prstGeom prst="ellipse">
+            <a:avLst/>
+          </a:prstGeom>
+          <a:ln w="104775">
+            <a:solidFill>
+              <a:srgbClr val="333B40"/>
+            </a:solidFill>
+          </a:ln>
+        </p:spPr>
+        <p:style>
+          <a:lnRef idx="1">
+            <a:schemeClr val="accent1"/>
+          </a:lnRef>
+          <a:fillRef idx="0">
+            <a:schemeClr val="accent1"/>
+          </a:fillRef>
+          <a:effectRef idx="0">
+            <a:schemeClr val="accent1"/>
+          </a:effectRef>
+          <a:fontRef idx="minor">
+            <a:schemeClr val="tx1"/>
+          </a:fontRef>
+        </p:style>
+        <p:txBody>
+          <a:bodyPr rtlCol="0" anchor="ctr"/>
+          <a:lstStyle/>
+          <a:p>
+            <a:pPr algn="ctr"/>
+            <a:endParaRPr lang="en-IL" dirty="0"/>
+          </a:p>
+        </p:txBody>
+      </p:sp>
+    </p:spTree>
+    <p:extLst>
+      <p:ext uri="{BB962C8B-B14F-4D97-AF65-F5344CB8AC3E}">
+        <p14:creationId xmlns:p14="http://schemas.microsoft.com/office/powerpoint/2010/main" val="2835226111"/>
+      </p:ext>
+    </p:extLst>
+  </p:cSld>
+  <p:clrMapOvr>
+    <a:overrideClrMapping bg1="lt1" tx1="dk1" bg2="lt2" tx2="dk2" accent1="accent1" accent2="accent2" accent3="accent3" accent4="accent4" accent5="accent5" accent6="accent6" hlink="hlink" folHlink="folHlink"/>
+  </p:clrMapOvr>
+</p:sld>
+</file>
+
+<file path=ppt/slides/slide4.xml><?xml version="1.0" encoding="utf-8"?>
+<p:sld xmlns:a="http://schemas.openxmlformats.org/drawingml/2006/main" xmlns:r="http://schemas.openxmlformats.org/officeDocument/2006/relationships" xmlns:p="http://schemas.openxmlformats.org/presentationml/2006/main">
+  <p:cSld>
+    <p:bg>
+      <p:bgPr>
+        <a:solidFill>
+          <a:srgbClr val="D4A0A0"/>
+        </a:solidFill>
+        <a:effectLst/>
+      </p:bgPr>
+    </p:bg>
+    <p:spTree>
+      <p:nvGrpSpPr>
+        <p:cNvPr id="1" name=""/>
+        <p:cNvGrpSpPr/>
+        <p:nvPr/>
+      </p:nvGrpSpPr>
+      <p:grpSpPr>
+        <a:xfrm>
+          <a:off x="0" y="0"/>
+          <a:ext cx="0" cy="0"/>
+          <a:chOff x="0" y="0"/>
+          <a:chExt cx="0" cy="0"/>
+        </a:xfrm>
+      </p:grpSpPr>
+      <p:cxnSp>
+        <p:nvCxnSpPr>
+          <p:cNvPr id="5" name="Straight Connector 4">
+            <a:extLst>
+              <a:ext uri="{FF2B5EF4-FFF2-40B4-BE49-F238E27FC236}">
+                <a16:creationId xmlns:a16="http://schemas.microsoft.com/office/drawing/2014/main" id="{3FDF4A82-C3AE-952C-FADC-65A06B61533C}"/>
+              </a:ext>
+            </a:extLst>
+          </p:cNvPr>
+          <p:cNvCxnSpPr>
+            <a:cxnSpLocks/>
+          </p:cNvCxnSpPr>
+          <p:nvPr/>
+        </p:nvCxnSpPr>
+        <p:spPr>
+          <a:xfrm>
+            <a:off x="1552501" y="6111435"/>
+            <a:ext cx="2161309" cy="0"/>
+          </a:xfrm>
+          <a:prstGeom prst="line">
+            <a:avLst/>
+          </a:prstGeom>
+          <a:ln w="104775">
+            <a:solidFill>
+              <a:srgbClr val="333B40"/>
+            </a:solidFill>
+          </a:ln>
+        </p:spPr>
+        <p:style>
+          <a:lnRef idx="1">
+            <a:schemeClr val="accent1"/>
+          </a:lnRef>
+          <a:fillRef idx="0">
+            <a:schemeClr val="accent1"/>
+          </a:fillRef>
+          <a:effectRef idx="0">
+            <a:schemeClr val="accent1"/>
+          </a:effectRef>
+          <a:fontRef idx="minor">
+            <a:schemeClr val="tx1"/>
+          </a:fontRef>
+        </p:style>
+      </p:cxnSp>
+      <p:cxnSp>
+        <p:nvCxnSpPr>
+          <p:cNvPr id="7" name="Straight Connector 6">
+            <a:extLst>
+              <a:ext uri="{FF2B5EF4-FFF2-40B4-BE49-F238E27FC236}">
+                <a16:creationId xmlns:a16="http://schemas.microsoft.com/office/drawing/2014/main" id="{576CED8E-4AF9-1EB6-F697-55398934A34E}"/>
+              </a:ext>
+            </a:extLst>
+          </p:cNvPr>
+          <p:cNvCxnSpPr>
+            <a:cxnSpLocks/>
+          </p:cNvCxnSpPr>
+          <p:nvPr/>
+        </p:nvCxnSpPr>
+        <p:spPr>
+          <a:xfrm>
+            <a:off x="1565564" y="900546"/>
+            <a:ext cx="3588327" cy="0"/>
+          </a:xfrm>
+          <a:prstGeom prst="line">
+            <a:avLst/>
+          </a:prstGeom>
+          <a:ln w="104775">
+            <a:solidFill>
+              <a:srgbClr val="333B40"/>
+            </a:solidFill>
+          </a:ln>
+        </p:spPr>
+        <p:style>
+          <a:lnRef idx="1">
+            <a:schemeClr val="accent1"/>
+          </a:lnRef>
+          <a:fillRef idx="0">
+            <a:schemeClr val="accent1"/>
+          </a:fillRef>
+          <a:effectRef idx="0">
+            <a:schemeClr val="accent1"/>
+          </a:effectRef>
+          <a:fontRef idx="minor">
+            <a:schemeClr val="tx1"/>
+          </a:fontRef>
+        </p:style>
+      </p:cxnSp>
+      <p:cxnSp>
+        <p:nvCxnSpPr>
+          <p:cNvPr id="9" name="Straight Connector 8">
+            <a:extLst>
+              <a:ext uri="{FF2B5EF4-FFF2-40B4-BE49-F238E27FC236}">
+                <a16:creationId xmlns:a16="http://schemas.microsoft.com/office/drawing/2014/main" id="{27082477-E756-3989-E13C-DB0A5EE19833}"/>
+              </a:ext>
+            </a:extLst>
+          </p:cNvPr>
+          <p:cNvCxnSpPr>
+            <a:cxnSpLocks/>
+          </p:cNvCxnSpPr>
+          <p:nvPr/>
+        </p:nvCxnSpPr>
+        <p:spPr>
+          <a:xfrm>
+            <a:off x="1592482" y="846710"/>
+            <a:ext cx="0" cy="5278581"/>
+          </a:xfrm>
+          <a:prstGeom prst="line">
+            <a:avLst/>
+          </a:prstGeom>
+          <a:ln w="104775">
+            <a:solidFill>
+              <a:srgbClr val="333B40"/>
+            </a:solidFill>
+          </a:ln>
+        </p:spPr>
+        <p:style>
+          <a:lnRef idx="1">
+            <a:schemeClr val="accent1"/>
+          </a:lnRef>
+          <a:fillRef idx="0">
+            <a:schemeClr val="accent1"/>
+          </a:fillRef>
+          <a:effectRef idx="0">
+            <a:schemeClr val="accent1"/>
+          </a:effectRef>
+          <a:fontRef idx="minor">
+            <a:schemeClr val="tx1"/>
+          </a:fontRef>
+        </p:style>
+      </p:cxnSp>
+      <p:sp>
+        <p:nvSpPr>
+          <p:cNvPr id="14" name="Rectangle 13">
+            <a:extLst>
+              <a:ext uri="{FF2B5EF4-FFF2-40B4-BE49-F238E27FC236}">
+                <a16:creationId xmlns:a16="http://schemas.microsoft.com/office/drawing/2014/main" id="{6EE72D93-98B5-F453-B8E4-23313C8E9FFF}"/>
+              </a:ext>
+            </a:extLst>
+          </p:cNvPr>
+          <p:cNvSpPr/>
+          <p:nvPr/>
+        </p:nvSpPr>
+        <p:spPr>
+          <a:xfrm>
+            <a:off x="-110836" y="-124691"/>
+            <a:ext cx="7051963" cy="7107382"/>
+          </a:xfrm>
+          <a:prstGeom prst="rect">
+            <a:avLst/>
+          </a:prstGeom>
+          <a:noFill/>
+        </p:spPr>
+        <p:style>
+          <a:lnRef idx="2">
+            <a:schemeClr val="accent1">
+              <a:shade val="50000"/>
+            </a:schemeClr>
+          </a:lnRef>
+          <a:fillRef idx="1">
+            <a:schemeClr val="accent1"/>
+          </a:fillRef>
+          <a:effectRef idx="0">
+            <a:schemeClr val="accent1"/>
+          </a:effectRef>
+          <a:fontRef idx="minor">
+            <a:schemeClr val="lt1"/>
+          </a:fontRef>
+        </p:style>
+        <p:txBody>
+          <a:bodyPr rtlCol="0" anchor="ctr"/>
+          <a:lstStyle/>
+          <a:p>
+            <a:pPr algn="ctr"/>
+            <a:endParaRPr lang="en-IL" dirty="0"/>
+          </a:p>
+        </p:txBody>
+      </p:sp>
+      <p:cxnSp>
+        <p:nvCxnSpPr>
+          <p:cNvPr id="15" name="Straight Connector 14">
+            <a:extLst>
+              <a:ext uri="{FF2B5EF4-FFF2-40B4-BE49-F238E27FC236}">
+                <a16:creationId xmlns:a16="http://schemas.microsoft.com/office/drawing/2014/main" id="{515AC805-0CB2-1961-39F9-71E8D685EC3D}"/>
+              </a:ext>
+            </a:extLst>
+          </p:cNvPr>
+          <p:cNvCxnSpPr>
+            <a:cxnSpLocks/>
+          </p:cNvCxnSpPr>
+          <p:nvPr/>
+        </p:nvCxnSpPr>
+        <p:spPr>
+          <a:xfrm flipV="1">
+            <a:off x="3407152" y="900546"/>
+            <a:ext cx="0" cy="554790"/>
+          </a:xfrm>
+          <a:prstGeom prst="line">
+            <a:avLst/>
+          </a:prstGeom>
+          <a:ln w="104775">
+            <a:solidFill>
+              <a:srgbClr val="333B40"/>
+            </a:solidFill>
+          </a:ln>
+        </p:spPr>
+        <p:style>
+          <a:lnRef idx="1">
+            <a:schemeClr val="accent1"/>
+          </a:lnRef>
+          <a:fillRef idx="0">
+            <a:schemeClr val="accent1"/>
+          </a:fillRef>
+          <a:effectRef idx="0">
+            <a:schemeClr val="accent1"/>
+          </a:effectRef>
+          <a:fontRef idx="minor">
+            <a:schemeClr val="tx1"/>
+          </a:fontRef>
+        </p:style>
+      </p:cxnSp>
+      <p:sp>
+        <p:nvSpPr>
+          <p:cNvPr id="17" name="Oval 16">
+            <a:extLst>
+              <a:ext uri="{FF2B5EF4-FFF2-40B4-BE49-F238E27FC236}">
+                <a16:creationId xmlns:a16="http://schemas.microsoft.com/office/drawing/2014/main" id="{54357F0B-BE38-2A7E-C039-215E3F2E868E}"/>
+              </a:ext>
+            </a:extLst>
+          </p:cNvPr>
+          <p:cNvSpPr/>
+          <p:nvPr/>
+        </p:nvSpPr>
+        <p:spPr>
+          <a:xfrm>
+            <a:off x="2899710" y="1455336"/>
+            <a:ext cx="1014884" cy="1004835"/>
+          </a:xfrm>
+          <a:prstGeom prst="ellipse">
+            <a:avLst/>
+          </a:prstGeom>
+          <a:ln w="104775">
+            <a:solidFill>
+              <a:srgbClr val="333B40"/>
+            </a:solidFill>
+          </a:ln>
+        </p:spPr>
+        <p:style>
+          <a:lnRef idx="1">
+            <a:schemeClr val="accent1"/>
+          </a:lnRef>
+          <a:fillRef idx="0">
+            <a:schemeClr val="accent1"/>
+          </a:fillRef>
+          <a:effectRef idx="0">
+            <a:schemeClr val="accent1"/>
+          </a:effectRef>
+          <a:fontRef idx="minor">
+            <a:schemeClr val="tx1"/>
+          </a:fontRef>
+        </p:style>
+        <p:txBody>
+          <a:bodyPr rtlCol="0" anchor="ctr"/>
+          <a:lstStyle/>
+          <a:p>
+            <a:pPr algn="ctr"/>
+            <a:endParaRPr lang="en-IL" dirty="0"/>
+          </a:p>
+        </p:txBody>
+      </p:sp>
+      <p:cxnSp>
+        <p:nvCxnSpPr>
+          <p:cNvPr id="18" name="Straight Connector 17">
+            <a:extLst>
+              <a:ext uri="{FF2B5EF4-FFF2-40B4-BE49-F238E27FC236}">
+                <a16:creationId xmlns:a16="http://schemas.microsoft.com/office/drawing/2014/main" id="{F05F4C2D-87F3-58B6-882D-2C5BC533F090}"/>
+              </a:ext>
+            </a:extLst>
+          </p:cNvPr>
+          <p:cNvCxnSpPr>
+            <a:cxnSpLocks/>
+          </p:cNvCxnSpPr>
+          <p:nvPr/>
+        </p:nvCxnSpPr>
+        <p:spPr>
+          <a:xfrm flipV="1">
+            <a:off x="3407152" y="2427892"/>
+            <a:ext cx="0" cy="1983334"/>
+          </a:xfrm>
+          <a:prstGeom prst="line">
+            <a:avLst/>
+          </a:prstGeom>
+          <a:ln w="104775">
+            <a:solidFill>
+              <a:srgbClr val="333B40"/>
+            </a:solidFill>
+          </a:ln>
+        </p:spPr>
+        <p:style>
+          <a:lnRef idx="1">
+            <a:schemeClr val="accent1"/>
+          </a:lnRef>
+          <a:fillRef idx="0">
+            <a:schemeClr val="accent1"/>
+          </a:fillRef>
+          <a:effectRef idx="0">
+            <a:schemeClr val="accent1"/>
+          </a:effectRef>
+          <a:fontRef idx="minor">
+            <a:schemeClr val="tx1"/>
+          </a:fontRef>
+        </p:style>
+      </p:cxnSp>
+    </p:spTree>
+    <p:extLst>
+      <p:ext uri="{BB962C8B-B14F-4D97-AF65-F5344CB8AC3E}">
+        <p14:creationId xmlns:p14="http://schemas.microsoft.com/office/powerpoint/2010/main" val="1901560205"/>
+      </p:ext>
+    </p:extLst>
+  </p:cSld>
+  <p:clrMapOvr>
+    <a:overrideClrMapping bg1="lt1" tx1="dk1" bg2="lt2" tx2="dk2" accent1="accent1" accent2="accent2" accent3="accent3" accent4="accent4" accent5="accent5" accent6="accent6" hlink="hlink" folHlink="folHlink"/>
+  </p:clrMapOvr>
+</p:sld>
+</file>
+
+<file path=ppt/slides/slide5.xml><?xml version="1.0" encoding="utf-8"?>
+<p:sld xmlns:a="http://schemas.openxmlformats.org/drawingml/2006/main" xmlns:r="http://schemas.openxmlformats.org/officeDocument/2006/relationships" xmlns:p="http://schemas.openxmlformats.org/presentationml/2006/main">
+  <p:cSld>
+    <p:bg>
+      <p:bgPr>
+        <a:solidFill>
+          <a:srgbClr val="D4A0A0"/>
+        </a:solidFill>
+        <a:effectLst/>
+      </p:bgPr>
+    </p:bg>
+    <p:spTree>
+      <p:nvGrpSpPr>
+        <p:cNvPr id="1" name=""/>
+        <p:cNvGrpSpPr/>
+        <p:nvPr/>
+      </p:nvGrpSpPr>
+      <p:grpSpPr>
+        <a:xfrm>
+          <a:off x="0" y="0"/>
+          <a:ext cx="0" cy="0"/>
+          <a:chOff x="0" y="0"/>
+          <a:chExt cx="0" cy="0"/>
+        </a:xfrm>
+      </p:grpSpPr>
+      <p:cxnSp>
+        <p:nvCxnSpPr>
+          <p:cNvPr id="5" name="Straight Connector 4">
+            <a:extLst>
+              <a:ext uri="{FF2B5EF4-FFF2-40B4-BE49-F238E27FC236}">
+                <a16:creationId xmlns:a16="http://schemas.microsoft.com/office/drawing/2014/main" id="{3FDF4A82-C3AE-952C-FADC-65A06B61533C}"/>
+              </a:ext>
+            </a:extLst>
+          </p:cNvPr>
+          <p:cNvCxnSpPr>
+            <a:cxnSpLocks/>
+          </p:cNvCxnSpPr>
+          <p:nvPr/>
+        </p:nvCxnSpPr>
+        <p:spPr>
+          <a:xfrm>
+            <a:off x="1552501" y="6124498"/>
+            <a:ext cx="2161309" cy="0"/>
+          </a:xfrm>
+          <a:prstGeom prst="line">
+            <a:avLst/>
+          </a:prstGeom>
+          <a:ln w="104775">
+            <a:solidFill>
+              <a:srgbClr val="333B40"/>
+            </a:solidFill>
+          </a:ln>
+        </p:spPr>
+        <p:style>
+          <a:lnRef idx="1">
+            <a:schemeClr val="accent1"/>
+          </a:lnRef>
+          <a:fillRef idx="0">
+            <a:schemeClr val="accent1"/>
+          </a:fillRef>
+          <a:effectRef idx="0">
+            <a:schemeClr val="accent1"/>
+          </a:effectRef>
+          <a:fontRef idx="minor">
+            <a:schemeClr val="tx1"/>
+          </a:fontRef>
+        </p:style>
+      </p:cxnSp>
+      <p:cxnSp>
+        <p:nvCxnSpPr>
+          <p:cNvPr id="7" name="Straight Connector 6">
+            <a:extLst>
+              <a:ext uri="{FF2B5EF4-FFF2-40B4-BE49-F238E27FC236}">
+                <a16:creationId xmlns:a16="http://schemas.microsoft.com/office/drawing/2014/main" id="{576CED8E-4AF9-1EB6-F697-55398934A34E}"/>
+              </a:ext>
+            </a:extLst>
+          </p:cNvPr>
+          <p:cNvCxnSpPr>
+            <a:cxnSpLocks/>
+          </p:cNvCxnSpPr>
+          <p:nvPr/>
+        </p:nvCxnSpPr>
+        <p:spPr>
+          <a:xfrm>
+            <a:off x="1565564" y="900546"/>
+            <a:ext cx="3588327" cy="0"/>
+          </a:xfrm>
+          <a:prstGeom prst="line">
+            <a:avLst/>
+          </a:prstGeom>
+          <a:ln w="104775">
+            <a:solidFill>
+              <a:srgbClr val="333B40"/>
+            </a:solidFill>
+          </a:ln>
+        </p:spPr>
+        <p:style>
+          <a:lnRef idx="1">
+            <a:schemeClr val="accent1"/>
+          </a:lnRef>
+          <a:fillRef idx="0">
+            <a:schemeClr val="accent1"/>
+          </a:fillRef>
+          <a:effectRef idx="0">
+            <a:schemeClr val="accent1"/>
+          </a:effectRef>
+          <a:fontRef idx="minor">
+            <a:schemeClr val="tx1"/>
+          </a:fontRef>
+        </p:style>
+      </p:cxnSp>
+      <p:cxnSp>
+        <p:nvCxnSpPr>
+          <p:cNvPr id="9" name="Straight Connector 8">
+            <a:extLst>
+              <a:ext uri="{FF2B5EF4-FFF2-40B4-BE49-F238E27FC236}">
+                <a16:creationId xmlns:a16="http://schemas.microsoft.com/office/drawing/2014/main" id="{27082477-E756-3989-E13C-DB0A5EE19833}"/>
+              </a:ext>
+            </a:extLst>
+          </p:cNvPr>
+          <p:cNvCxnSpPr>
+            <a:cxnSpLocks/>
+          </p:cNvCxnSpPr>
+          <p:nvPr/>
+        </p:nvCxnSpPr>
+        <p:spPr>
+          <a:xfrm>
+            <a:off x="1605545" y="859773"/>
+            <a:ext cx="0" cy="5278581"/>
+          </a:xfrm>
+          <a:prstGeom prst="line">
+            <a:avLst/>
+          </a:prstGeom>
+          <a:ln w="104775">
+            <a:solidFill>
+              <a:srgbClr val="333B40"/>
+            </a:solidFill>
+          </a:ln>
+        </p:spPr>
+        <p:style>
+          <a:lnRef idx="1">
+            <a:schemeClr val="accent1"/>
+          </a:lnRef>
+          <a:fillRef idx="0">
+            <a:schemeClr val="accent1"/>
+          </a:fillRef>
+          <a:effectRef idx="0">
+            <a:schemeClr val="accent1"/>
+          </a:effectRef>
+          <a:fontRef idx="minor">
+            <a:schemeClr val="tx1"/>
+          </a:fontRef>
+        </p:style>
+      </p:cxnSp>
+      <p:sp>
+        <p:nvSpPr>
+          <p:cNvPr id="14" name="Rectangle 13">
+            <a:extLst>
+              <a:ext uri="{FF2B5EF4-FFF2-40B4-BE49-F238E27FC236}">
+                <a16:creationId xmlns:a16="http://schemas.microsoft.com/office/drawing/2014/main" id="{6EE72D93-98B5-F453-B8E4-23313C8E9FFF}"/>
+              </a:ext>
+            </a:extLst>
+          </p:cNvPr>
+          <p:cNvSpPr/>
+          <p:nvPr/>
+        </p:nvSpPr>
+        <p:spPr>
+          <a:xfrm>
+            <a:off x="-110836" y="-124691"/>
+            <a:ext cx="7051963" cy="7107382"/>
+          </a:xfrm>
+          <a:prstGeom prst="rect">
+            <a:avLst/>
+          </a:prstGeom>
+          <a:noFill/>
+        </p:spPr>
+        <p:style>
+          <a:lnRef idx="2">
+            <a:schemeClr val="accent1">
+              <a:shade val="50000"/>
+            </a:schemeClr>
+          </a:lnRef>
+          <a:fillRef idx="1">
+            <a:schemeClr val="accent1"/>
+          </a:fillRef>
+          <a:effectRef idx="0">
+            <a:schemeClr val="accent1"/>
+          </a:effectRef>
+          <a:fontRef idx="minor">
+            <a:schemeClr val="lt1"/>
+          </a:fontRef>
+        </p:style>
+        <p:txBody>
+          <a:bodyPr rtlCol="0" anchor="ctr"/>
+          <a:lstStyle/>
+          <a:p>
+            <a:pPr algn="ctr"/>
+            <a:endParaRPr lang="en-IL" dirty="0"/>
+          </a:p>
+        </p:txBody>
+      </p:sp>
+      <p:cxnSp>
+        <p:nvCxnSpPr>
+          <p:cNvPr id="15" name="Straight Connector 14">
+            <a:extLst>
+              <a:ext uri="{FF2B5EF4-FFF2-40B4-BE49-F238E27FC236}">
+                <a16:creationId xmlns:a16="http://schemas.microsoft.com/office/drawing/2014/main" id="{515AC805-0CB2-1961-39F9-71E8D685EC3D}"/>
+              </a:ext>
+            </a:extLst>
+          </p:cNvPr>
+          <p:cNvCxnSpPr>
+            <a:cxnSpLocks/>
+          </p:cNvCxnSpPr>
+          <p:nvPr/>
+        </p:nvCxnSpPr>
+        <p:spPr>
+          <a:xfrm flipV="1">
+            <a:off x="3407152" y="900546"/>
+            <a:ext cx="0" cy="554790"/>
+          </a:xfrm>
+          <a:prstGeom prst="line">
+            <a:avLst/>
+          </a:prstGeom>
+          <a:ln w="104775">
+            <a:solidFill>
+              <a:srgbClr val="333B40"/>
+            </a:solidFill>
+          </a:ln>
+        </p:spPr>
+        <p:style>
+          <a:lnRef idx="1">
+            <a:schemeClr val="accent1"/>
+          </a:lnRef>
+          <a:fillRef idx="0">
+            <a:schemeClr val="accent1"/>
+          </a:fillRef>
+          <a:effectRef idx="0">
+            <a:schemeClr val="accent1"/>
+          </a:effectRef>
+          <a:fontRef idx="minor">
+            <a:schemeClr val="tx1"/>
+          </a:fontRef>
+        </p:style>
+      </p:cxnSp>
+      <p:sp>
+        <p:nvSpPr>
+          <p:cNvPr id="17" name="Oval 16">
+            <a:extLst>
+              <a:ext uri="{FF2B5EF4-FFF2-40B4-BE49-F238E27FC236}">
+                <a16:creationId xmlns:a16="http://schemas.microsoft.com/office/drawing/2014/main" id="{54357F0B-BE38-2A7E-C039-215E3F2E868E}"/>
+              </a:ext>
+            </a:extLst>
+          </p:cNvPr>
+          <p:cNvSpPr/>
+          <p:nvPr/>
+        </p:nvSpPr>
+        <p:spPr>
+          <a:xfrm>
+            <a:off x="2899710" y="1455336"/>
+            <a:ext cx="1014884" cy="1004835"/>
+          </a:xfrm>
+          <a:prstGeom prst="ellipse">
+            <a:avLst/>
+          </a:prstGeom>
+          <a:ln w="104775">
+            <a:solidFill>
+              <a:srgbClr val="333B40"/>
+            </a:solidFill>
+          </a:ln>
+        </p:spPr>
+        <p:style>
+          <a:lnRef idx="1">
+            <a:schemeClr val="accent1"/>
+          </a:lnRef>
+          <a:fillRef idx="0">
+            <a:schemeClr val="accent1"/>
+          </a:fillRef>
+          <a:effectRef idx="0">
+            <a:schemeClr val="accent1"/>
+          </a:effectRef>
+          <a:fontRef idx="minor">
+            <a:schemeClr val="tx1"/>
+          </a:fontRef>
+        </p:style>
+        <p:txBody>
+          <a:bodyPr rtlCol="0" anchor="ctr"/>
+          <a:lstStyle/>
+          <a:p>
+            <a:pPr algn="ctr"/>
+            <a:endParaRPr lang="en-IL" dirty="0"/>
+          </a:p>
+        </p:txBody>
+      </p:sp>
+      <p:cxnSp>
+        <p:nvCxnSpPr>
+          <p:cNvPr id="18" name="Straight Connector 17">
+            <a:extLst>
+              <a:ext uri="{FF2B5EF4-FFF2-40B4-BE49-F238E27FC236}">
+                <a16:creationId xmlns:a16="http://schemas.microsoft.com/office/drawing/2014/main" id="{F05F4C2D-87F3-58B6-882D-2C5BC533F090}"/>
+              </a:ext>
+            </a:extLst>
+          </p:cNvPr>
+          <p:cNvCxnSpPr>
+            <a:cxnSpLocks/>
+          </p:cNvCxnSpPr>
+          <p:nvPr/>
+        </p:nvCxnSpPr>
+        <p:spPr>
+          <a:xfrm flipV="1">
+            <a:off x="3407152" y="2427892"/>
+            <a:ext cx="0" cy="1983334"/>
+          </a:xfrm>
+          <a:prstGeom prst="line">
+            <a:avLst/>
+          </a:prstGeom>
+          <a:ln w="104775">
+            <a:solidFill>
+              <a:srgbClr val="333B40"/>
+            </a:solidFill>
+          </a:ln>
+        </p:spPr>
+        <p:style>
+          <a:lnRef idx="1">
+            <a:schemeClr val="accent1"/>
+          </a:lnRef>
+          <a:fillRef idx="0">
+            <a:schemeClr val="accent1"/>
+          </a:fillRef>
+          <a:effectRef idx="0">
+            <a:schemeClr val="accent1"/>
+          </a:effectRef>
+          <a:fontRef idx="minor">
+            <a:schemeClr val="tx1"/>
+          </a:fontRef>
+        </p:style>
+      </p:cxnSp>
+      <p:cxnSp>
+        <p:nvCxnSpPr>
+          <p:cNvPr id="20" name="Straight Connector 19">
+            <a:extLst>
+              <a:ext uri="{FF2B5EF4-FFF2-40B4-BE49-F238E27FC236}">
+                <a16:creationId xmlns:a16="http://schemas.microsoft.com/office/drawing/2014/main" id="{25526115-DA94-4D06-E712-487C6A12655F}"/>
+              </a:ext>
+            </a:extLst>
+          </p:cNvPr>
+          <p:cNvCxnSpPr>
+            <a:cxnSpLocks/>
+          </p:cNvCxnSpPr>
+          <p:nvPr/>
+        </p:nvCxnSpPr>
+        <p:spPr>
+          <a:xfrm flipH="1" flipV="1">
+            <a:off x="3415145" y="2783393"/>
+            <a:ext cx="499449" cy="371294"/>
+          </a:xfrm>
+          <a:prstGeom prst="line">
+            <a:avLst/>
+          </a:prstGeom>
+          <a:ln w="104775">
+            <a:solidFill>
+              <a:srgbClr val="333B40"/>
+            </a:solidFill>
+          </a:ln>
+        </p:spPr>
+        <p:style>
+          <a:lnRef idx="1">
+            <a:schemeClr val="accent1"/>
+          </a:lnRef>
+          <a:fillRef idx="0">
+            <a:schemeClr val="accent1"/>
+          </a:fillRef>
+          <a:effectRef idx="0">
+            <a:schemeClr val="accent1"/>
+          </a:effectRef>
+          <a:fontRef idx="minor">
+            <a:schemeClr val="tx1"/>
+          </a:fontRef>
+        </p:style>
+      </p:cxnSp>
+    </p:spTree>
+    <p:extLst>
+      <p:ext uri="{BB962C8B-B14F-4D97-AF65-F5344CB8AC3E}">
+        <p14:creationId xmlns:p14="http://schemas.microsoft.com/office/powerpoint/2010/main" val="245852311"/>
+      </p:ext>
+    </p:extLst>
+  </p:cSld>
+  <p:clrMapOvr>
+    <a:overrideClrMapping bg1="lt1" tx1="dk1" bg2="lt2" tx2="dk2" accent1="accent1" accent2="accent2" accent3="accent3" accent4="accent4" accent5="accent5" accent6="accent6" hlink="hlink" folHlink="folHlink"/>
+  </p:clrMapOvr>
+</p:sld>
+</file>
+
+<file path=ppt/slides/slide6.xml><?xml version="1.0" encoding="utf-8"?>
+<p:sld xmlns:a="http://schemas.openxmlformats.org/drawingml/2006/main" xmlns:r="http://schemas.openxmlformats.org/officeDocument/2006/relationships" xmlns:p="http://schemas.openxmlformats.org/presentationml/2006/main">
+  <p:cSld>
+    <p:bg>
+      <p:bgPr>
+        <a:solidFill>
+          <a:srgbClr val="D4A0A0"/>
+        </a:solidFill>
+        <a:effectLst/>
+      </p:bgPr>
+    </p:bg>
+    <p:spTree>
+      <p:nvGrpSpPr>
+        <p:cNvPr id="1" name=""/>
+        <p:cNvGrpSpPr/>
+        <p:nvPr/>
+      </p:nvGrpSpPr>
+      <p:grpSpPr>
+        <a:xfrm>
+          <a:off x="0" y="0"/>
+          <a:ext cx="0" cy="0"/>
+          <a:chOff x="0" y="0"/>
+          <a:chExt cx="0" cy="0"/>
+        </a:xfrm>
+      </p:grpSpPr>
+      <p:cxnSp>
+        <p:nvCxnSpPr>
+          <p:cNvPr id="5" name="Straight Connector 4">
+            <a:extLst>
+              <a:ext uri="{FF2B5EF4-FFF2-40B4-BE49-F238E27FC236}">
+                <a16:creationId xmlns:a16="http://schemas.microsoft.com/office/drawing/2014/main" id="{3FDF4A82-C3AE-952C-FADC-65A06B61533C}"/>
+              </a:ext>
+            </a:extLst>
+          </p:cNvPr>
+          <p:cNvCxnSpPr>
+            <a:cxnSpLocks/>
+          </p:cNvCxnSpPr>
+          <p:nvPr/>
+        </p:nvCxnSpPr>
+        <p:spPr>
+          <a:xfrm>
+            <a:off x="1552501" y="6124498"/>
+            <a:ext cx="2161309" cy="0"/>
+          </a:xfrm>
+          <a:prstGeom prst="line">
+            <a:avLst/>
+          </a:prstGeom>
+          <a:ln w="104775">
+            <a:solidFill>
+              <a:srgbClr val="333B40"/>
+            </a:solidFill>
+          </a:ln>
+        </p:spPr>
+        <p:style>
+          <a:lnRef idx="1">
+            <a:schemeClr val="accent1"/>
+          </a:lnRef>
+          <a:fillRef idx="0">
+            <a:schemeClr val="accent1"/>
+          </a:fillRef>
+          <a:effectRef idx="0">
+            <a:schemeClr val="accent1"/>
+          </a:effectRef>
+          <a:fontRef idx="minor">
+            <a:schemeClr val="tx1"/>
+          </a:fontRef>
+        </p:style>
+      </p:cxnSp>
+      <p:cxnSp>
+        <p:nvCxnSpPr>
+          <p:cNvPr id="7" name="Straight Connector 6">
+            <a:extLst>
+              <a:ext uri="{FF2B5EF4-FFF2-40B4-BE49-F238E27FC236}">
+                <a16:creationId xmlns:a16="http://schemas.microsoft.com/office/drawing/2014/main" id="{576CED8E-4AF9-1EB6-F697-55398934A34E}"/>
+              </a:ext>
+            </a:extLst>
+          </p:cNvPr>
+          <p:cNvCxnSpPr>
+            <a:cxnSpLocks/>
+          </p:cNvCxnSpPr>
+          <p:nvPr/>
+        </p:nvCxnSpPr>
+        <p:spPr>
+          <a:xfrm>
+            <a:off x="1565564" y="900546"/>
+            <a:ext cx="3588327" cy="0"/>
+          </a:xfrm>
+          <a:prstGeom prst="line">
+            <a:avLst/>
+          </a:prstGeom>
+          <a:ln w="104775">
+            <a:solidFill>
+              <a:srgbClr val="333B40"/>
+            </a:solidFill>
+          </a:ln>
+        </p:spPr>
+        <p:style>
+          <a:lnRef idx="1">
+            <a:schemeClr val="accent1"/>
+          </a:lnRef>
+          <a:fillRef idx="0">
+            <a:schemeClr val="accent1"/>
+          </a:fillRef>
+          <a:effectRef idx="0">
+            <a:schemeClr val="accent1"/>
+          </a:effectRef>
+          <a:fontRef idx="minor">
+            <a:schemeClr val="tx1"/>
+          </a:fontRef>
+        </p:style>
+      </p:cxnSp>
+      <p:cxnSp>
+        <p:nvCxnSpPr>
+          <p:cNvPr id="9" name="Straight Connector 8">
+            <a:extLst>
+              <a:ext uri="{FF2B5EF4-FFF2-40B4-BE49-F238E27FC236}">
+                <a16:creationId xmlns:a16="http://schemas.microsoft.com/office/drawing/2014/main" id="{27082477-E756-3989-E13C-DB0A5EE19833}"/>
+              </a:ext>
+            </a:extLst>
+          </p:cNvPr>
+          <p:cNvCxnSpPr>
+            <a:cxnSpLocks/>
+          </p:cNvCxnSpPr>
+          <p:nvPr/>
+        </p:nvCxnSpPr>
+        <p:spPr>
+          <a:xfrm>
+            <a:off x="1592482" y="859773"/>
+            <a:ext cx="0" cy="5278581"/>
+          </a:xfrm>
+          <a:prstGeom prst="line">
+            <a:avLst/>
+          </a:prstGeom>
+          <a:ln w="104775">
+            <a:solidFill>
+              <a:srgbClr val="333B40"/>
+            </a:solidFill>
+          </a:ln>
+        </p:spPr>
+        <p:style>
+          <a:lnRef idx="1">
+            <a:schemeClr val="accent1"/>
+          </a:lnRef>
+          <a:fillRef idx="0">
+            <a:schemeClr val="accent1"/>
+          </a:fillRef>
+          <a:effectRef idx="0">
+            <a:schemeClr val="accent1"/>
+          </a:effectRef>
+          <a:fontRef idx="minor">
+            <a:schemeClr val="tx1"/>
+          </a:fontRef>
+        </p:style>
+      </p:cxnSp>
+      <p:sp>
+        <p:nvSpPr>
+          <p:cNvPr id="14" name="Rectangle 13">
+            <a:extLst>
+              <a:ext uri="{FF2B5EF4-FFF2-40B4-BE49-F238E27FC236}">
+                <a16:creationId xmlns:a16="http://schemas.microsoft.com/office/drawing/2014/main" id="{6EE72D93-98B5-F453-B8E4-23313C8E9FFF}"/>
+              </a:ext>
+            </a:extLst>
+          </p:cNvPr>
+          <p:cNvSpPr/>
+          <p:nvPr/>
+        </p:nvSpPr>
+        <p:spPr>
+          <a:xfrm>
+            <a:off x="-110836" y="-124691"/>
+            <a:ext cx="7051963" cy="7107382"/>
+          </a:xfrm>
+          <a:prstGeom prst="rect">
+            <a:avLst/>
+          </a:prstGeom>
+          <a:noFill/>
+        </p:spPr>
+        <p:style>
+          <a:lnRef idx="2">
+            <a:schemeClr val="accent1">
+              <a:shade val="50000"/>
+            </a:schemeClr>
+          </a:lnRef>
+          <a:fillRef idx="1">
+            <a:schemeClr val="accent1"/>
+          </a:fillRef>
+          <a:effectRef idx="0">
+            <a:schemeClr val="accent1"/>
+          </a:effectRef>
+          <a:fontRef idx="minor">
+            <a:schemeClr val="lt1"/>
+          </a:fontRef>
+        </p:style>
+        <p:txBody>
+          <a:bodyPr rtlCol="0" anchor="ctr"/>
+          <a:lstStyle/>
+          <a:p>
+            <a:pPr algn="ctr"/>
+            <a:endParaRPr lang="en-IL" dirty="0"/>
+          </a:p>
+        </p:txBody>
+      </p:sp>
+      <p:cxnSp>
+        <p:nvCxnSpPr>
+          <p:cNvPr id="15" name="Straight Connector 14">
+            <a:extLst>
+              <a:ext uri="{FF2B5EF4-FFF2-40B4-BE49-F238E27FC236}">
+                <a16:creationId xmlns:a16="http://schemas.microsoft.com/office/drawing/2014/main" id="{515AC805-0CB2-1961-39F9-71E8D685EC3D}"/>
+              </a:ext>
+            </a:extLst>
+          </p:cNvPr>
+          <p:cNvCxnSpPr>
+            <a:cxnSpLocks/>
+          </p:cNvCxnSpPr>
+          <p:nvPr/>
+        </p:nvCxnSpPr>
+        <p:spPr>
+          <a:xfrm flipV="1">
+            <a:off x="3407152" y="900546"/>
+            <a:ext cx="0" cy="554790"/>
+          </a:xfrm>
+          <a:prstGeom prst="line">
+            <a:avLst/>
+          </a:prstGeom>
+          <a:ln w="104775">
+            <a:solidFill>
+              <a:srgbClr val="333B40"/>
+            </a:solidFill>
+          </a:ln>
+        </p:spPr>
+        <p:style>
+          <a:lnRef idx="1">
+            <a:schemeClr val="accent1"/>
+          </a:lnRef>
+          <a:fillRef idx="0">
+            <a:schemeClr val="accent1"/>
+          </a:fillRef>
+          <a:effectRef idx="0">
+            <a:schemeClr val="accent1"/>
+          </a:effectRef>
+          <a:fontRef idx="minor">
+            <a:schemeClr val="tx1"/>
+          </a:fontRef>
+        </p:style>
+      </p:cxnSp>
+      <p:sp>
+        <p:nvSpPr>
+          <p:cNvPr id="17" name="Oval 16">
+            <a:extLst>
+              <a:ext uri="{FF2B5EF4-FFF2-40B4-BE49-F238E27FC236}">
+                <a16:creationId xmlns:a16="http://schemas.microsoft.com/office/drawing/2014/main" id="{54357F0B-BE38-2A7E-C039-215E3F2E868E}"/>
+              </a:ext>
+            </a:extLst>
+          </p:cNvPr>
+          <p:cNvSpPr/>
+          <p:nvPr/>
+        </p:nvSpPr>
+        <p:spPr>
+          <a:xfrm>
+            <a:off x="2899710" y="1455336"/>
+            <a:ext cx="1014884" cy="1004835"/>
+          </a:xfrm>
+          <a:prstGeom prst="ellipse">
+            <a:avLst/>
+          </a:prstGeom>
+          <a:ln w="104775">
+            <a:solidFill>
+              <a:srgbClr val="333B40"/>
+            </a:solidFill>
+          </a:ln>
+        </p:spPr>
+        <p:style>
+          <a:lnRef idx="1">
+            <a:schemeClr val="accent1"/>
+          </a:lnRef>
+          <a:fillRef idx="0">
+            <a:schemeClr val="accent1"/>
+          </a:fillRef>
+          <a:effectRef idx="0">
+            <a:schemeClr val="accent1"/>
+          </a:effectRef>
+          <a:fontRef idx="minor">
+            <a:schemeClr val="tx1"/>
+          </a:fontRef>
+        </p:style>
+        <p:txBody>
+          <a:bodyPr rtlCol="0" anchor="ctr"/>
+          <a:lstStyle/>
+          <a:p>
+            <a:pPr algn="ctr"/>
+            <a:endParaRPr lang="en-IL" dirty="0"/>
+          </a:p>
+        </p:txBody>
+      </p:sp>
+      <p:cxnSp>
+        <p:nvCxnSpPr>
+          <p:cNvPr id="18" name="Straight Connector 17">
+            <a:extLst>
+              <a:ext uri="{FF2B5EF4-FFF2-40B4-BE49-F238E27FC236}">
+                <a16:creationId xmlns:a16="http://schemas.microsoft.com/office/drawing/2014/main" id="{F05F4C2D-87F3-58B6-882D-2C5BC533F090}"/>
+              </a:ext>
+            </a:extLst>
+          </p:cNvPr>
+          <p:cNvCxnSpPr>
+            <a:cxnSpLocks/>
+          </p:cNvCxnSpPr>
+          <p:nvPr/>
+        </p:nvCxnSpPr>
+        <p:spPr>
+          <a:xfrm flipV="1">
+            <a:off x="3407152" y="2427892"/>
+            <a:ext cx="0" cy="1983334"/>
+          </a:xfrm>
+          <a:prstGeom prst="line">
+            <a:avLst/>
+          </a:prstGeom>
+          <a:ln w="104775">
+            <a:solidFill>
+              <a:srgbClr val="333B40"/>
+            </a:solidFill>
+          </a:ln>
+        </p:spPr>
+        <p:style>
+          <a:lnRef idx="1">
+            <a:schemeClr val="accent1"/>
+          </a:lnRef>
+          <a:fillRef idx="0">
+            <a:schemeClr val="accent1"/>
+          </a:fillRef>
+          <a:effectRef idx="0">
+            <a:schemeClr val="accent1"/>
+          </a:effectRef>
+          <a:fontRef idx="minor">
+            <a:schemeClr val="tx1"/>
+          </a:fontRef>
+        </p:style>
+      </p:cxnSp>
+      <p:cxnSp>
+        <p:nvCxnSpPr>
+          <p:cNvPr id="20" name="Straight Connector 19">
+            <a:extLst>
+              <a:ext uri="{FF2B5EF4-FFF2-40B4-BE49-F238E27FC236}">
+                <a16:creationId xmlns:a16="http://schemas.microsoft.com/office/drawing/2014/main" id="{25526115-DA94-4D06-E712-487C6A12655F}"/>
+              </a:ext>
+            </a:extLst>
+          </p:cNvPr>
+          <p:cNvCxnSpPr>
+            <a:cxnSpLocks/>
+          </p:cNvCxnSpPr>
+          <p:nvPr/>
+        </p:nvCxnSpPr>
+        <p:spPr>
+          <a:xfrm flipH="1" flipV="1">
+            <a:off x="3415145" y="2783393"/>
+            <a:ext cx="499449" cy="371294"/>
+          </a:xfrm>
+          <a:prstGeom prst="line">
+            <a:avLst/>
+          </a:prstGeom>
+          <a:ln w="104775">
+            <a:solidFill>
+              <a:srgbClr val="333B40"/>
+            </a:solidFill>
+          </a:ln>
+        </p:spPr>
+        <p:style>
+          <a:lnRef idx="1">
+            <a:schemeClr val="accent1"/>
+          </a:lnRef>
+          <a:fillRef idx="0">
+            <a:schemeClr val="accent1"/>
+          </a:fillRef>
+          <a:effectRef idx="0">
+            <a:schemeClr val="accent1"/>
+          </a:effectRef>
+          <a:fontRef idx="minor">
+            <a:schemeClr val="tx1"/>
+          </a:fontRef>
+        </p:style>
+      </p:cxnSp>
+      <p:cxnSp>
+        <p:nvCxnSpPr>
+          <p:cNvPr id="23" name="Straight Connector 22">
+            <a:extLst>
+              <a:ext uri="{FF2B5EF4-FFF2-40B4-BE49-F238E27FC236}">
+                <a16:creationId xmlns:a16="http://schemas.microsoft.com/office/drawing/2014/main" id="{4393BC4A-8E55-98A9-6827-2EF9E6B6717F}"/>
+              </a:ext>
+            </a:extLst>
+          </p:cNvPr>
+          <p:cNvCxnSpPr>
+            <a:cxnSpLocks/>
+          </p:cNvCxnSpPr>
+          <p:nvPr/>
+        </p:nvCxnSpPr>
+        <p:spPr>
+          <a:xfrm flipV="1">
+            <a:off x="2921539" y="2783393"/>
+            <a:ext cx="463785" cy="386691"/>
+          </a:xfrm>
+          <a:prstGeom prst="line">
+            <a:avLst/>
+          </a:prstGeom>
+          <a:ln w="104775">
+            <a:solidFill>
+              <a:srgbClr val="333B40"/>
+            </a:solidFill>
+          </a:ln>
+        </p:spPr>
+        <p:style>
+          <a:lnRef idx="1">
+            <a:schemeClr val="accent1"/>
+          </a:lnRef>
+          <a:fillRef idx="0">
+            <a:schemeClr val="accent1"/>
+          </a:fillRef>
+          <a:effectRef idx="0">
+            <a:schemeClr val="accent1"/>
+          </a:effectRef>
+          <a:fontRef idx="minor">
+            <a:schemeClr val="tx1"/>
+          </a:fontRef>
+        </p:style>
+      </p:cxnSp>
+    </p:spTree>
+    <p:extLst>
+      <p:ext uri="{BB962C8B-B14F-4D97-AF65-F5344CB8AC3E}">
+        <p14:creationId xmlns:p14="http://schemas.microsoft.com/office/powerpoint/2010/main" val="4274681655"/>
+      </p:ext>
+    </p:extLst>
+  </p:cSld>
+  <p:clrMapOvr>
+    <a:overrideClrMapping bg1="lt1" tx1="dk1" bg2="lt2" tx2="dk2" accent1="accent1" accent2="accent2" accent3="accent3" accent4="accent4" accent5="accent5" accent6="accent6" hlink="hlink" folHlink="folHlink"/>
+  </p:clrMapOvr>
+</p:sld>
+</file>
+
+<file path=ppt/slides/slide7.xml><?xml version="1.0" encoding="utf-8"?>
+<p:sld xmlns:a="http://schemas.openxmlformats.org/drawingml/2006/main" xmlns:r="http://schemas.openxmlformats.org/officeDocument/2006/relationships" xmlns:p="http://schemas.openxmlformats.org/presentationml/2006/main">
+  <p:cSld>
+    <p:bg>
+      <p:bgPr>
+        <a:solidFill>
+          <a:srgbClr val="D4A0A0"/>
+        </a:solidFill>
+        <a:effectLst/>
+      </p:bgPr>
+    </p:bg>
+    <p:spTree>
+      <p:nvGrpSpPr>
+        <p:cNvPr id="1" name=""/>
+        <p:cNvGrpSpPr/>
+        <p:nvPr/>
+      </p:nvGrpSpPr>
+      <p:grpSpPr>
+        <a:xfrm>
+          <a:off x="0" y="0"/>
+          <a:ext cx="0" cy="0"/>
+          <a:chOff x="0" y="0"/>
+          <a:chExt cx="0" cy="0"/>
+        </a:xfrm>
+      </p:grpSpPr>
+      <p:cxnSp>
+        <p:nvCxnSpPr>
+          <p:cNvPr id="5" name="Straight Connector 4">
+            <a:extLst>
+              <a:ext uri="{FF2B5EF4-FFF2-40B4-BE49-F238E27FC236}">
+                <a16:creationId xmlns:a16="http://schemas.microsoft.com/office/drawing/2014/main" id="{3FDF4A82-C3AE-952C-FADC-65A06B61533C}"/>
+              </a:ext>
+            </a:extLst>
+          </p:cNvPr>
+          <p:cNvCxnSpPr>
+            <a:cxnSpLocks/>
+          </p:cNvCxnSpPr>
+          <p:nvPr/>
+        </p:nvCxnSpPr>
+        <p:spPr>
+          <a:xfrm>
+            <a:off x="1552501" y="6124498"/>
+            <a:ext cx="2161309" cy="0"/>
+          </a:xfrm>
+          <a:prstGeom prst="line">
+            <a:avLst/>
+          </a:prstGeom>
+          <a:ln w="104775">
+            <a:solidFill>
+              <a:srgbClr val="333B40"/>
+            </a:solidFill>
+          </a:ln>
+        </p:spPr>
+        <p:style>
+          <a:lnRef idx="1">
+            <a:schemeClr val="accent1"/>
+          </a:lnRef>
+          <a:fillRef idx="0">
+            <a:schemeClr val="accent1"/>
+          </a:fillRef>
+          <a:effectRef idx="0">
+            <a:schemeClr val="accent1"/>
+          </a:effectRef>
+          <a:fontRef idx="minor">
+            <a:schemeClr val="tx1"/>
+          </a:fontRef>
+        </p:style>
+      </p:cxnSp>
+      <p:cxnSp>
+        <p:nvCxnSpPr>
+          <p:cNvPr id="7" name="Straight Connector 6">
+            <a:extLst>
+              <a:ext uri="{FF2B5EF4-FFF2-40B4-BE49-F238E27FC236}">
+                <a16:creationId xmlns:a16="http://schemas.microsoft.com/office/drawing/2014/main" id="{576CED8E-4AF9-1EB6-F697-55398934A34E}"/>
+              </a:ext>
+            </a:extLst>
+          </p:cNvPr>
+          <p:cNvCxnSpPr>
+            <a:cxnSpLocks/>
+          </p:cNvCxnSpPr>
+          <p:nvPr/>
+        </p:nvCxnSpPr>
+        <p:spPr>
+          <a:xfrm>
+            <a:off x="1565564" y="900546"/>
+            <a:ext cx="3588327" cy="0"/>
+          </a:xfrm>
+          <a:prstGeom prst="line">
+            <a:avLst/>
+          </a:prstGeom>
+          <a:ln w="104775">
+            <a:solidFill>
+              <a:srgbClr val="333B40"/>
+            </a:solidFill>
+          </a:ln>
+        </p:spPr>
+        <p:style>
+          <a:lnRef idx="1">
+            <a:schemeClr val="accent1"/>
+          </a:lnRef>
+          <a:fillRef idx="0">
+            <a:schemeClr val="accent1"/>
+          </a:fillRef>
+          <a:effectRef idx="0">
+            <a:schemeClr val="accent1"/>
+          </a:effectRef>
+          <a:fontRef idx="minor">
+            <a:schemeClr val="tx1"/>
+          </a:fontRef>
+        </p:style>
+      </p:cxnSp>
+      <p:cxnSp>
+        <p:nvCxnSpPr>
+          <p:cNvPr id="9" name="Straight Connector 8">
+            <a:extLst>
+              <a:ext uri="{FF2B5EF4-FFF2-40B4-BE49-F238E27FC236}">
+                <a16:creationId xmlns:a16="http://schemas.microsoft.com/office/drawing/2014/main" id="{27082477-E756-3989-E13C-DB0A5EE19833}"/>
+              </a:ext>
+            </a:extLst>
+          </p:cNvPr>
+          <p:cNvCxnSpPr>
+            <a:cxnSpLocks/>
+          </p:cNvCxnSpPr>
+          <p:nvPr/>
+        </p:nvCxnSpPr>
+        <p:spPr>
+          <a:xfrm>
+            <a:off x="1592482" y="859773"/>
+            <a:ext cx="0" cy="5278581"/>
+          </a:xfrm>
+          <a:prstGeom prst="line">
+            <a:avLst/>
+          </a:prstGeom>
+          <a:ln w="104775">
+            <a:solidFill>
+              <a:srgbClr val="333B40"/>
+            </a:solidFill>
+          </a:ln>
+        </p:spPr>
+        <p:style>
+          <a:lnRef idx="1">
+            <a:schemeClr val="accent1"/>
+          </a:lnRef>
+          <a:fillRef idx="0">
+            <a:schemeClr val="accent1"/>
+          </a:fillRef>
+          <a:effectRef idx="0">
+            <a:schemeClr val="accent1"/>
+          </a:effectRef>
+          <a:fontRef idx="minor">
+            <a:schemeClr val="tx1"/>
+          </a:fontRef>
+        </p:style>
+      </p:cxnSp>
+      <p:sp>
+        <p:nvSpPr>
+          <p:cNvPr id="14" name="Rectangle 13">
+            <a:extLst>
+              <a:ext uri="{FF2B5EF4-FFF2-40B4-BE49-F238E27FC236}">
+                <a16:creationId xmlns:a16="http://schemas.microsoft.com/office/drawing/2014/main" id="{6EE72D93-98B5-F453-B8E4-23313C8E9FFF}"/>
+              </a:ext>
+            </a:extLst>
+          </p:cNvPr>
+          <p:cNvSpPr/>
+          <p:nvPr/>
+        </p:nvSpPr>
+        <p:spPr>
+          <a:xfrm>
+            <a:off x="-110836" y="-124691"/>
+            <a:ext cx="7051963" cy="7107382"/>
+          </a:xfrm>
+          <a:prstGeom prst="rect">
+            <a:avLst/>
+          </a:prstGeom>
+          <a:noFill/>
+        </p:spPr>
+        <p:style>
+          <a:lnRef idx="2">
+            <a:schemeClr val="accent1">
+              <a:shade val="50000"/>
+            </a:schemeClr>
+          </a:lnRef>
+          <a:fillRef idx="1">
+            <a:schemeClr val="accent1"/>
+          </a:fillRef>
+          <a:effectRef idx="0">
+            <a:schemeClr val="accent1"/>
+          </a:effectRef>
+          <a:fontRef idx="minor">
+            <a:schemeClr val="lt1"/>
+          </a:fontRef>
+        </p:style>
+        <p:txBody>
+          <a:bodyPr rtlCol="0" anchor="ctr"/>
+          <a:lstStyle/>
+          <a:p>
+            <a:pPr algn="ctr"/>
+            <a:endParaRPr lang="en-IL" dirty="0"/>
+          </a:p>
+        </p:txBody>
+      </p:sp>
+      <p:cxnSp>
+        <p:nvCxnSpPr>
+          <p:cNvPr id="15" name="Straight Connector 14">
+            <a:extLst>
+              <a:ext uri="{FF2B5EF4-FFF2-40B4-BE49-F238E27FC236}">
+                <a16:creationId xmlns:a16="http://schemas.microsoft.com/office/drawing/2014/main" id="{515AC805-0CB2-1961-39F9-71E8D685EC3D}"/>
+              </a:ext>
+            </a:extLst>
+          </p:cNvPr>
+          <p:cNvCxnSpPr>
+            <a:cxnSpLocks/>
+          </p:cNvCxnSpPr>
+          <p:nvPr/>
+        </p:nvCxnSpPr>
+        <p:spPr>
+          <a:xfrm flipV="1">
+            <a:off x="3407152" y="900546"/>
+            <a:ext cx="0" cy="554790"/>
+          </a:xfrm>
+          <a:prstGeom prst="line">
+            <a:avLst/>
+          </a:prstGeom>
+          <a:ln w="104775">
+            <a:solidFill>
+              <a:srgbClr val="333B40"/>
+            </a:solidFill>
+          </a:ln>
+        </p:spPr>
+        <p:style>
+          <a:lnRef idx="1">
+            <a:schemeClr val="accent1"/>
+          </a:lnRef>
+          <a:fillRef idx="0">
+            <a:schemeClr val="accent1"/>
+          </a:fillRef>
+          <a:effectRef idx="0">
+            <a:schemeClr val="accent1"/>
+          </a:effectRef>
+          <a:fontRef idx="minor">
+            <a:schemeClr val="tx1"/>
+          </a:fontRef>
+        </p:style>
+      </p:cxnSp>
+      <p:sp>
+        <p:nvSpPr>
+          <p:cNvPr id="17" name="Oval 16">
+            <a:extLst>
+              <a:ext uri="{FF2B5EF4-FFF2-40B4-BE49-F238E27FC236}">
+                <a16:creationId xmlns:a16="http://schemas.microsoft.com/office/drawing/2014/main" id="{54357F0B-BE38-2A7E-C039-215E3F2E868E}"/>
+              </a:ext>
+            </a:extLst>
+          </p:cNvPr>
+          <p:cNvSpPr/>
+          <p:nvPr/>
+        </p:nvSpPr>
+        <p:spPr>
+          <a:xfrm>
+            <a:off x="2899710" y="1455336"/>
+            <a:ext cx="1014884" cy="1004835"/>
+          </a:xfrm>
+          <a:prstGeom prst="ellipse">
+            <a:avLst/>
+          </a:prstGeom>
+          <a:ln w="104775">
+            <a:solidFill>
+              <a:srgbClr val="333B40"/>
+            </a:solidFill>
+          </a:ln>
+        </p:spPr>
+        <p:style>
+          <a:lnRef idx="1">
+            <a:schemeClr val="accent1"/>
+          </a:lnRef>
+          <a:fillRef idx="0">
+            <a:schemeClr val="accent1"/>
+          </a:fillRef>
+          <a:effectRef idx="0">
+            <a:schemeClr val="accent1"/>
+          </a:effectRef>
+          <a:fontRef idx="minor">
+            <a:schemeClr val="tx1"/>
+          </a:fontRef>
+        </p:style>
+        <p:txBody>
+          <a:bodyPr rtlCol="0" anchor="ctr"/>
+          <a:lstStyle/>
+          <a:p>
+            <a:pPr algn="ctr"/>
+            <a:endParaRPr lang="en-IL" dirty="0"/>
+          </a:p>
+        </p:txBody>
+      </p:sp>
+      <p:cxnSp>
+        <p:nvCxnSpPr>
+          <p:cNvPr id="18" name="Straight Connector 17">
+            <a:extLst>
+              <a:ext uri="{FF2B5EF4-FFF2-40B4-BE49-F238E27FC236}">
+                <a16:creationId xmlns:a16="http://schemas.microsoft.com/office/drawing/2014/main" id="{F05F4C2D-87F3-58B6-882D-2C5BC533F090}"/>
+              </a:ext>
+            </a:extLst>
+          </p:cNvPr>
+          <p:cNvCxnSpPr>
+            <a:cxnSpLocks/>
+          </p:cNvCxnSpPr>
+          <p:nvPr/>
+        </p:nvCxnSpPr>
+        <p:spPr>
+          <a:xfrm flipV="1">
+            <a:off x="3407152" y="2427892"/>
+            <a:ext cx="0" cy="1983334"/>
+          </a:xfrm>
+          <a:prstGeom prst="line">
+            <a:avLst/>
+          </a:prstGeom>
+          <a:ln w="104775">
+            <a:solidFill>
+              <a:srgbClr val="333B40"/>
+            </a:solidFill>
+          </a:ln>
+        </p:spPr>
+        <p:style>
+          <a:lnRef idx="1">
+            <a:schemeClr val="accent1"/>
+          </a:lnRef>
+          <a:fillRef idx="0">
+            <a:schemeClr val="accent1"/>
+          </a:fillRef>
+          <a:effectRef idx="0">
+            <a:schemeClr val="accent1"/>
+          </a:effectRef>
+          <a:fontRef idx="minor">
+            <a:schemeClr val="tx1"/>
+          </a:fontRef>
+        </p:style>
+      </p:cxnSp>
+      <p:cxnSp>
+        <p:nvCxnSpPr>
+          <p:cNvPr id="20" name="Straight Connector 19">
+            <a:extLst>
+              <a:ext uri="{FF2B5EF4-FFF2-40B4-BE49-F238E27FC236}">
+                <a16:creationId xmlns:a16="http://schemas.microsoft.com/office/drawing/2014/main" id="{25526115-DA94-4D06-E712-487C6A12655F}"/>
+              </a:ext>
+            </a:extLst>
+          </p:cNvPr>
+          <p:cNvCxnSpPr>
+            <a:cxnSpLocks/>
+          </p:cNvCxnSpPr>
+          <p:nvPr/>
+        </p:nvCxnSpPr>
+        <p:spPr>
+          <a:xfrm flipH="1" flipV="1">
+            <a:off x="3415145" y="2783393"/>
+            <a:ext cx="499449" cy="371294"/>
+          </a:xfrm>
+          <a:prstGeom prst="line">
+            <a:avLst/>
+          </a:prstGeom>
+          <a:ln w="104775">
+            <a:solidFill>
+              <a:srgbClr val="333B40"/>
+            </a:solidFill>
+          </a:ln>
+        </p:spPr>
+        <p:style>
+          <a:lnRef idx="1">
+            <a:schemeClr val="accent1"/>
+          </a:lnRef>
+          <a:fillRef idx="0">
+            <a:schemeClr val="accent1"/>
+          </a:fillRef>
+          <a:effectRef idx="0">
+            <a:schemeClr val="accent1"/>
+          </a:effectRef>
+          <a:fontRef idx="minor">
+            <a:schemeClr val="tx1"/>
+          </a:fontRef>
+        </p:style>
+      </p:cxnSp>
+      <p:cxnSp>
+        <p:nvCxnSpPr>
+          <p:cNvPr id="23" name="Straight Connector 22">
+            <a:extLst>
+              <a:ext uri="{FF2B5EF4-FFF2-40B4-BE49-F238E27FC236}">
+                <a16:creationId xmlns:a16="http://schemas.microsoft.com/office/drawing/2014/main" id="{4393BC4A-8E55-98A9-6827-2EF9E6B6717F}"/>
+              </a:ext>
+            </a:extLst>
+          </p:cNvPr>
+          <p:cNvCxnSpPr>
+            <a:cxnSpLocks/>
+          </p:cNvCxnSpPr>
+          <p:nvPr/>
+        </p:nvCxnSpPr>
+        <p:spPr>
+          <a:xfrm flipV="1">
+            <a:off x="2921539" y="2783393"/>
+            <a:ext cx="463785" cy="386691"/>
+          </a:xfrm>
+          <a:prstGeom prst="line">
+            <a:avLst/>
+          </a:prstGeom>
+          <a:ln w="104775">
+            <a:solidFill>
+              <a:srgbClr val="333B40"/>
+            </a:solidFill>
+          </a:ln>
+        </p:spPr>
+        <p:style>
+          <a:lnRef idx="1">
+            <a:schemeClr val="accent1"/>
+          </a:lnRef>
+          <a:fillRef idx="0">
+            <a:schemeClr val="accent1"/>
+          </a:fillRef>
+          <a:effectRef idx="0">
+            <a:schemeClr val="accent1"/>
+          </a:effectRef>
+          <a:fontRef idx="minor">
+            <a:schemeClr val="tx1"/>
+          </a:fontRef>
+        </p:style>
+      </p:cxnSp>
+      <p:cxnSp>
+        <p:nvCxnSpPr>
+          <p:cNvPr id="26" name="Straight Connector 25">
+            <a:extLst>
+              <a:ext uri="{FF2B5EF4-FFF2-40B4-BE49-F238E27FC236}">
+                <a16:creationId xmlns:a16="http://schemas.microsoft.com/office/drawing/2014/main" id="{A84AD84C-6F98-87E5-91BA-9E6B8A2BAA54}"/>
+              </a:ext>
+            </a:extLst>
+          </p:cNvPr>
+          <p:cNvCxnSpPr>
+            <a:cxnSpLocks/>
+          </p:cNvCxnSpPr>
+          <p:nvPr/>
+        </p:nvCxnSpPr>
+        <p:spPr>
+          <a:xfrm flipH="1" flipV="1">
+            <a:off x="3400833" y="4392290"/>
+            <a:ext cx="499449" cy="371294"/>
+          </a:xfrm>
+          <a:prstGeom prst="line">
+            <a:avLst/>
+          </a:prstGeom>
+          <a:ln w="104775">
+            <a:solidFill>
+              <a:srgbClr val="333B40"/>
+            </a:solidFill>
+          </a:ln>
+        </p:spPr>
+        <p:style>
+          <a:lnRef idx="1">
+            <a:schemeClr val="accent1"/>
+          </a:lnRef>
+          <a:fillRef idx="0">
+            <a:schemeClr val="accent1"/>
+          </a:fillRef>
+          <a:effectRef idx="0">
+            <a:schemeClr val="accent1"/>
+          </a:effectRef>
+          <a:fontRef idx="minor">
+            <a:schemeClr val="tx1"/>
+          </a:fontRef>
+        </p:style>
+      </p:cxnSp>
+    </p:spTree>
+    <p:extLst>
+      <p:ext uri="{BB962C8B-B14F-4D97-AF65-F5344CB8AC3E}">
+        <p14:creationId xmlns:p14="http://schemas.microsoft.com/office/powerpoint/2010/main" val="2281337128"/>
+      </p:ext>
+    </p:extLst>
+  </p:cSld>
+  <p:clrMapOvr>
+    <a:overrideClrMapping bg1="lt1" tx1="dk1" bg2="lt2" tx2="dk2" accent1="accent1" accent2="accent2" accent3="accent3" accent4="accent4" accent5="accent5" accent6="accent6" hlink="hlink" folHlink="folHlink"/>
+  </p:clrMapOvr>
+</p:sld>
+</file>
+
+<file path=ppt/slides/slide8.xml><?xml version="1.0" encoding="utf-8"?>
+<p:sld xmlns:a="http://schemas.openxmlformats.org/drawingml/2006/main" xmlns:r="http://schemas.openxmlformats.org/officeDocument/2006/relationships" xmlns:p="http://schemas.openxmlformats.org/presentationml/2006/main">
+  <p:cSld>
+    <p:bg>
+      <p:bgPr>
+        <a:solidFill>
+          <a:srgbClr val="D4A0A0"/>
+        </a:solidFill>
+        <a:effectLst/>
+      </p:bgPr>
+    </p:bg>
+    <p:spTree>
+      <p:nvGrpSpPr>
+        <p:cNvPr id="1" name=""/>
+        <p:cNvGrpSpPr/>
+        <p:nvPr/>
+      </p:nvGrpSpPr>
+      <p:grpSpPr>
+        <a:xfrm>
+          <a:off x="0" y="0"/>
+          <a:ext cx="0" cy="0"/>
+          <a:chOff x="0" y="0"/>
+          <a:chExt cx="0" cy="0"/>
+        </a:xfrm>
+      </p:grpSpPr>
+      <p:cxnSp>
+        <p:nvCxnSpPr>
+          <p:cNvPr id="5" name="Straight Connector 4">
+            <a:extLst>
+              <a:ext uri="{FF2B5EF4-FFF2-40B4-BE49-F238E27FC236}">
+                <a16:creationId xmlns:a16="http://schemas.microsoft.com/office/drawing/2014/main" id="{3FDF4A82-C3AE-952C-FADC-65A06B61533C}"/>
+              </a:ext>
+            </a:extLst>
+          </p:cNvPr>
+          <p:cNvCxnSpPr>
+            <a:cxnSpLocks/>
+          </p:cNvCxnSpPr>
+          <p:nvPr/>
+        </p:nvCxnSpPr>
+        <p:spPr>
+          <a:xfrm>
+            <a:off x="1552501" y="6124498"/>
+            <a:ext cx="2161309" cy="0"/>
+          </a:xfrm>
+          <a:prstGeom prst="line">
+            <a:avLst/>
+          </a:prstGeom>
+          <a:ln w="104775">
+            <a:solidFill>
+              <a:srgbClr val="333B40"/>
+            </a:solidFill>
+          </a:ln>
+        </p:spPr>
+        <p:style>
+          <a:lnRef idx="1">
+            <a:schemeClr val="accent1"/>
+          </a:lnRef>
+          <a:fillRef idx="0">
+            <a:schemeClr val="accent1"/>
+          </a:fillRef>
+          <a:effectRef idx="0">
+            <a:schemeClr val="accent1"/>
+          </a:effectRef>
+          <a:fontRef idx="minor">
+            <a:schemeClr val="tx1"/>
+          </a:fontRef>
+        </p:style>
+      </p:cxnSp>
+      <p:cxnSp>
+        <p:nvCxnSpPr>
+          <p:cNvPr id="7" name="Straight Connector 6">
+            <a:extLst>
+              <a:ext uri="{FF2B5EF4-FFF2-40B4-BE49-F238E27FC236}">
+                <a16:creationId xmlns:a16="http://schemas.microsoft.com/office/drawing/2014/main" id="{576CED8E-4AF9-1EB6-F697-55398934A34E}"/>
+              </a:ext>
+            </a:extLst>
+          </p:cNvPr>
+          <p:cNvCxnSpPr>
+            <a:cxnSpLocks/>
+          </p:cNvCxnSpPr>
+          <p:nvPr/>
+        </p:nvCxnSpPr>
+        <p:spPr>
+          <a:xfrm>
+            <a:off x="1565564" y="900546"/>
+            <a:ext cx="3588327" cy="0"/>
+          </a:xfrm>
+          <a:prstGeom prst="line">
+            <a:avLst/>
+          </a:prstGeom>
+          <a:ln w="104775">
+            <a:solidFill>
+              <a:srgbClr val="333B40"/>
+            </a:solidFill>
+          </a:ln>
+        </p:spPr>
+        <p:style>
+          <a:lnRef idx="1">
+            <a:schemeClr val="accent1"/>
+          </a:lnRef>
+          <a:fillRef idx="0">
+            <a:schemeClr val="accent1"/>
+          </a:fillRef>
+          <a:effectRef idx="0">
+            <a:schemeClr val="accent1"/>
+          </a:effectRef>
+          <a:fontRef idx="minor">
+            <a:schemeClr val="tx1"/>
+          </a:fontRef>
+        </p:style>
+      </p:cxnSp>
+      <p:cxnSp>
+        <p:nvCxnSpPr>
+          <p:cNvPr id="9" name="Straight Connector 8">
+            <a:extLst>
+              <a:ext uri="{FF2B5EF4-FFF2-40B4-BE49-F238E27FC236}">
+                <a16:creationId xmlns:a16="http://schemas.microsoft.com/office/drawing/2014/main" id="{27082477-E756-3989-E13C-DB0A5EE19833}"/>
+              </a:ext>
+            </a:extLst>
+          </p:cNvPr>
+          <p:cNvCxnSpPr>
+            <a:cxnSpLocks/>
+          </p:cNvCxnSpPr>
+          <p:nvPr/>
+        </p:nvCxnSpPr>
+        <p:spPr>
+          <a:xfrm>
+            <a:off x="1592482" y="859773"/>
+            <a:ext cx="0" cy="5278581"/>
+          </a:xfrm>
+          <a:prstGeom prst="line">
+            <a:avLst/>
+          </a:prstGeom>
+          <a:ln w="104775">
+            <a:solidFill>
+              <a:srgbClr val="333B40"/>
+            </a:solidFill>
+          </a:ln>
+        </p:spPr>
+        <p:style>
+          <a:lnRef idx="1">
+            <a:schemeClr val="accent1"/>
+          </a:lnRef>
+          <a:fillRef idx="0">
+            <a:schemeClr val="accent1"/>
+          </a:fillRef>
+          <a:effectRef idx="0">
+            <a:schemeClr val="accent1"/>
+          </a:effectRef>
+          <a:fontRef idx="minor">
+            <a:schemeClr val="tx1"/>
+          </a:fontRef>
+        </p:style>
+      </p:cxnSp>
+      <p:sp>
+        <p:nvSpPr>
+          <p:cNvPr id="14" name="Rectangle 13">
+            <a:extLst>
+              <a:ext uri="{FF2B5EF4-FFF2-40B4-BE49-F238E27FC236}">
+                <a16:creationId xmlns:a16="http://schemas.microsoft.com/office/drawing/2014/main" id="{6EE72D93-98B5-F453-B8E4-23313C8E9FFF}"/>
+              </a:ext>
+            </a:extLst>
+          </p:cNvPr>
+          <p:cNvSpPr/>
+          <p:nvPr/>
+        </p:nvSpPr>
+        <p:spPr>
+          <a:xfrm>
+            <a:off x="-110836" y="-124691"/>
+            <a:ext cx="7051963" cy="7107382"/>
+          </a:xfrm>
+          <a:prstGeom prst="rect">
+            <a:avLst/>
+          </a:prstGeom>
+          <a:noFill/>
+        </p:spPr>
+        <p:style>
+          <a:lnRef idx="2">
+            <a:schemeClr val="accent1">
+              <a:shade val="50000"/>
+            </a:schemeClr>
+          </a:lnRef>
+          <a:fillRef idx="1">
+            <a:schemeClr val="accent1"/>
+          </a:fillRef>
+          <a:effectRef idx="0">
+            <a:schemeClr val="accent1"/>
+          </a:effectRef>
+          <a:fontRef idx="minor">
+            <a:schemeClr val="lt1"/>
+          </a:fontRef>
+        </p:style>
+        <p:txBody>
+          <a:bodyPr rtlCol="0" anchor="ctr"/>
+          <a:lstStyle/>
+          <a:p>
+            <a:pPr algn="ctr"/>
+            <a:endParaRPr lang="en-IL" dirty="0"/>
+          </a:p>
+        </p:txBody>
+      </p:sp>
+      <p:cxnSp>
+        <p:nvCxnSpPr>
+          <p:cNvPr id="15" name="Straight Connector 14">
+            <a:extLst>
+              <a:ext uri="{FF2B5EF4-FFF2-40B4-BE49-F238E27FC236}">
+                <a16:creationId xmlns:a16="http://schemas.microsoft.com/office/drawing/2014/main" id="{515AC805-0CB2-1961-39F9-71E8D685EC3D}"/>
+              </a:ext>
+            </a:extLst>
+          </p:cNvPr>
+          <p:cNvCxnSpPr>
+            <a:cxnSpLocks/>
+          </p:cNvCxnSpPr>
+          <p:nvPr/>
+        </p:nvCxnSpPr>
+        <p:spPr>
+          <a:xfrm flipV="1">
+            <a:off x="3407152" y="900546"/>
+            <a:ext cx="0" cy="554790"/>
+          </a:xfrm>
+          <a:prstGeom prst="line">
+            <a:avLst/>
+          </a:prstGeom>
+          <a:ln w="104775">
+            <a:solidFill>
+              <a:srgbClr val="333B40"/>
+            </a:solidFill>
+          </a:ln>
+        </p:spPr>
+        <p:style>
+          <a:lnRef idx="1">
+            <a:schemeClr val="accent1"/>
+          </a:lnRef>
+          <a:fillRef idx="0">
+            <a:schemeClr val="accent1"/>
+          </a:fillRef>
+          <a:effectRef idx="0">
+            <a:schemeClr val="accent1"/>
+          </a:effectRef>
+          <a:fontRef idx="minor">
+            <a:schemeClr val="tx1"/>
+          </a:fontRef>
+        </p:style>
+      </p:cxnSp>
+      <p:sp>
+        <p:nvSpPr>
+          <p:cNvPr id="17" name="Oval 16">
+            <a:extLst>
+              <a:ext uri="{FF2B5EF4-FFF2-40B4-BE49-F238E27FC236}">
+                <a16:creationId xmlns:a16="http://schemas.microsoft.com/office/drawing/2014/main" id="{54357F0B-BE38-2A7E-C039-215E3F2E868E}"/>
+              </a:ext>
+            </a:extLst>
+          </p:cNvPr>
+          <p:cNvSpPr/>
+          <p:nvPr/>
+        </p:nvSpPr>
+        <p:spPr>
+          <a:xfrm>
+            <a:off x="2899710" y="1455336"/>
+            <a:ext cx="1014884" cy="1004835"/>
+          </a:xfrm>
+          <a:prstGeom prst="ellipse">
+            <a:avLst/>
+          </a:prstGeom>
+          <a:ln w="104775">
+            <a:solidFill>
+              <a:srgbClr val="333B40"/>
+            </a:solidFill>
+          </a:ln>
+        </p:spPr>
+        <p:style>
+          <a:lnRef idx="1">
+            <a:schemeClr val="accent1"/>
+          </a:lnRef>
+          <a:fillRef idx="0">
+            <a:schemeClr val="accent1"/>
+          </a:fillRef>
+          <a:effectRef idx="0">
+            <a:schemeClr val="accent1"/>
+          </a:effectRef>
+          <a:fontRef idx="minor">
+            <a:schemeClr val="tx1"/>
+          </a:fontRef>
+        </p:style>
+        <p:txBody>
+          <a:bodyPr rtlCol="0" anchor="ctr"/>
+          <a:lstStyle/>
+          <a:p>
+            <a:pPr algn="ctr"/>
+            <a:endParaRPr lang="en-IL" dirty="0"/>
+          </a:p>
+        </p:txBody>
+      </p:sp>
+      <p:cxnSp>
+        <p:nvCxnSpPr>
+          <p:cNvPr id="18" name="Straight Connector 17">
+            <a:extLst>
+              <a:ext uri="{FF2B5EF4-FFF2-40B4-BE49-F238E27FC236}">
+                <a16:creationId xmlns:a16="http://schemas.microsoft.com/office/drawing/2014/main" id="{F05F4C2D-87F3-58B6-882D-2C5BC533F090}"/>
+              </a:ext>
+            </a:extLst>
+          </p:cNvPr>
+          <p:cNvCxnSpPr>
+            <a:cxnSpLocks/>
+          </p:cNvCxnSpPr>
+          <p:nvPr/>
+        </p:nvCxnSpPr>
+        <p:spPr>
+          <a:xfrm flipV="1">
+            <a:off x="3407152" y="2427892"/>
+            <a:ext cx="0" cy="1983334"/>
+          </a:xfrm>
+          <a:prstGeom prst="line">
+            <a:avLst/>
+          </a:prstGeom>
+          <a:ln w="104775">
+            <a:solidFill>
+              <a:srgbClr val="333B40"/>
+            </a:solidFill>
+          </a:ln>
+        </p:spPr>
+        <p:style>
+          <a:lnRef idx="1">
+            <a:schemeClr val="accent1"/>
+          </a:lnRef>
+          <a:fillRef idx="0">
+            <a:schemeClr val="accent1"/>
+          </a:fillRef>
+          <a:effectRef idx="0">
+            <a:schemeClr val="accent1"/>
+          </a:effectRef>
+          <a:fontRef idx="minor">
+            <a:schemeClr val="tx1"/>
+          </a:fontRef>
+        </p:style>
+      </p:cxnSp>
+      <p:cxnSp>
+        <p:nvCxnSpPr>
+          <p:cNvPr id="20" name="Straight Connector 19">
+            <a:extLst>
+              <a:ext uri="{FF2B5EF4-FFF2-40B4-BE49-F238E27FC236}">
+                <a16:creationId xmlns:a16="http://schemas.microsoft.com/office/drawing/2014/main" id="{25526115-DA94-4D06-E712-487C6A12655F}"/>
+              </a:ext>
+            </a:extLst>
+          </p:cNvPr>
+          <p:cNvCxnSpPr>
+            <a:cxnSpLocks/>
+          </p:cNvCxnSpPr>
+          <p:nvPr/>
+        </p:nvCxnSpPr>
+        <p:spPr>
+          <a:xfrm flipH="1" flipV="1">
+            <a:off x="3415145" y="2783393"/>
+            <a:ext cx="499449" cy="371294"/>
+          </a:xfrm>
+          <a:prstGeom prst="line">
+            <a:avLst/>
+          </a:prstGeom>
+          <a:ln w="104775">
+            <a:solidFill>
+              <a:srgbClr val="333B40"/>
+            </a:solidFill>
+          </a:ln>
+        </p:spPr>
+        <p:style>
+          <a:lnRef idx="1">
+            <a:schemeClr val="accent1"/>
+          </a:lnRef>
+          <a:fillRef idx="0">
+            <a:schemeClr val="accent1"/>
+          </a:fillRef>
+          <a:effectRef idx="0">
+            <a:schemeClr val="accent1"/>
+          </a:effectRef>
+          <a:fontRef idx="minor">
+            <a:schemeClr val="tx1"/>
+          </a:fontRef>
+        </p:style>
+      </p:cxnSp>
+      <p:cxnSp>
+        <p:nvCxnSpPr>
+          <p:cNvPr id="23" name="Straight Connector 22">
+            <a:extLst>
+              <a:ext uri="{FF2B5EF4-FFF2-40B4-BE49-F238E27FC236}">
+                <a16:creationId xmlns:a16="http://schemas.microsoft.com/office/drawing/2014/main" id="{4393BC4A-8E55-98A9-6827-2EF9E6B6717F}"/>
+              </a:ext>
+            </a:extLst>
+          </p:cNvPr>
+          <p:cNvCxnSpPr>
+            <a:cxnSpLocks/>
+          </p:cNvCxnSpPr>
+          <p:nvPr/>
+        </p:nvCxnSpPr>
+        <p:spPr>
+          <a:xfrm flipV="1">
+            <a:off x="2921539" y="2783393"/>
+            <a:ext cx="463785" cy="386691"/>
+          </a:xfrm>
+          <a:prstGeom prst="line">
+            <a:avLst/>
+          </a:prstGeom>
+          <a:ln w="104775">
+            <a:solidFill>
+              <a:srgbClr val="333B40"/>
+            </a:solidFill>
+          </a:ln>
+        </p:spPr>
+        <p:style>
+          <a:lnRef idx="1">
+            <a:schemeClr val="accent1"/>
+          </a:lnRef>
+          <a:fillRef idx="0">
+            <a:schemeClr val="accent1"/>
+          </a:fillRef>
+          <a:effectRef idx="0">
+            <a:schemeClr val="accent1"/>
+          </a:effectRef>
+          <a:fontRef idx="minor">
+            <a:schemeClr val="tx1"/>
+          </a:fontRef>
+        </p:style>
+      </p:cxnSp>
+      <p:cxnSp>
+        <p:nvCxnSpPr>
+          <p:cNvPr id="26" name="Straight Connector 25">
+            <a:extLst>
+              <a:ext uri="{FF2B5EF4-FFF2-40B4-BE49-F238E27FC236}">
+                <a16:creationId xmlns:a16="http://schemas.microsoft.com/office/drawing/2014/main" id="{A84AD84C-6F98-87E5-91BA-9E6B8A2BAA54}"/>
+              </a:ext>
+            </a:extLst>
+          </p:cNvPr>
+          <p:cNvCxnSpPr>
+            <a:cxnSpLocks/>
+          </p:cNvCxnSpPr>
+          <p:nvPr/>
+        </p:nvCxnSpPr>
+        <p:spPr>
+          <a:xfrm flipH="1" flipV="1">
+            <a:off x="3400833" y="4392290"/>
+            <a:ext cx="499449" cy="371294"/>
+          </a:xfrm>
+          <a:prstGeom prst="line">
+            <a:avLst/>
+          </a:prstGeom>
+          <a:ln w="104775">
+            <a:solidFill>
+              <a:srgbClr val="333B40"/>
+            </a:solidFill>
+          </a:ln>
+        </p:spPr>
+        <p:style>
+          <a:lnRef idx="1">
+            <a:schemeClr val="accent1"/>
+          </a:lnRef>
+          <a:fillRef idx="0">
+            <a:schemeClr val="accent1"/>
+          </a:fillRef>
+          <a:effectRef idx="0">
+            <a:schemeClr val="accent1"/>
+          </a:effectRef>
+          <a:fontRef idx="minor">
+            <a:schemeClr val="tx1"/>
+          </a:fontRef>
+        </p:style>
+      </p:cxnSp>
+      <p:cxnSp>
+        <p:nvCxnSpPr>
+          <p:cNvPr id="27" name="Straight Connector 26">
+            <a:extLst>
+              <a:ext uri="{FF2B5EF4-FFF2-40B4-BE49-F238E27FC236}">
+                <a16:creationId xmlns:a16="http://schemas.microsoft.com/office/drawing/2014/main" id="{62A2F672-D327-3C46-99BC-187E8D765C5C}"/>
+              </a:ext>
+            </a:extLst>
+          </p:cNvPr>
+          <p:cNvCxnSpPr>
+            <a:cxnSpLocks/>
+          </p:cNvCxnSpPr>
+          <p:nvPr/>
+        </p:nvCxnSpPr>
+        <p:spPr>
+          <a:xfrm flipV="1">
+            <a:off x="2943599" y="4407687"/>
+            <a:ext cx="463785" cy="386691"/>
+          </a:xfrm>
+          <a:prstGeom prst="line">
+            <a:avLst/>
+          </a:prstGeom>
+          <a:ln w="104775">
+            <a:solidFill>
+              <a:srgbClr val="333B40"/>
+            </a:solidFill>
+          </a:ln>
+        </p:spPr>
+        <p:style>
+          <a:lnRef idx="1">
+            <a:schemeClr val="accent1"/>
+          </a:lnRef>
+          <a:fillRef idx="0">
+            <a:schemeClr val="accent1"/>
+          </a:fillRef>
+          <a:effectRef idx="0">
+            <a:schemeClr val="accent1"/>
+          </a:effectRef>
+          <a:fontRef idx="minor">
+            <a:schemeClr val="tx1"/>
+          </a:fontRef>
+        </p:style>
+      </p:cxnSp>
+    </p:spTree>
+    <p:extLst>
+      <p:ext uri="{BB962C8B-B14F-4D97-AF65-F5344CB8AC3E}">
+        <p14:creationId xmlns:p14="http://schemas.microsoft.com/office/powerpoint/2010/main" val="3112050093"/>
+      </p:ext>
+    </p:extLst>
+  </p:cSld>
+  <p:clrMapOvr>
+    <a:overrideClrMapping bg1="lt1" tx1="dk1" bg2="lt2" tx2="dk2" accent1="accent1" accent2="accent2" accent3="accent3" accent4="accent4" accent5="accent5" accent6="accent6" hlink="hlink" folHlink="folHlink"/>
+  </p:clrMapOvr>
+</p:sld>
+</file>
+
+<file path=ppt/slides/slide9.xml><?xml version="1.0" encoding="utf-8"?>
 <p:sld xmlns:a="http://schemas.openxmlformats.org/drawingml/2006/main" xmlns:r="http://schemas.openxmlformats.org/officeDocument/2006/relationships" xmlns:p="http://schemas.openxmlformats.org/presentationml/2006/main">
   <p:cSld>
     <p:bg>
@@ -4422,182 +7098,6 @@
     <p:extLst>
       <p:ext uri="{BB962C8B-B14F-4D97-AF65-F5344CB8AC3E}">
         <p14:creationId xmlns:p14="http://schemas.microsoft.com/office/powerpoint/2010/main" val="1868862022"/>
-      </p:ext>
-    </p:extLst>
-  </p:cSld>
-  <p:clrMapOvr>
-    <a:masterClrMapping/>
-  </p:clrMapOvr>
-</p:sld>
-</file>
-
-<file path=ppt/slides/slide3.xml><?xml version="1.0" encoding="utf-8"?>
-<p:sld xmlns:a="http://schemas.openxmlformats.org/drawingml/2006/main" xmlns:r="http://schemas.openxmlformats.org/officeDocument/2006/relationships" xmlns:p="http://schemas.openxmlformats.org/presentationml/2006/main">
-  <p:cSld>
-    <p:bg>
-      <p:bgPr>
-        <a:solidFill>
-          <a:srgbClr val="086E3B"/>
-        </a:solidFill>
-        <a:effectLst/>
-      </p:bgPr>
-    </p:bg>
-    <p:spTree>
-      <p:nvGrpSpPr>
-        <p:cNvPr id="1" name=""/>
-        <p:cNvGrpSpPr/>
-        <p:nvPr/>
-      </p:nvGrpSpPr>
-      <p:grpSpPr>
-        <a:xfrm>
-          <a:off x="0" y="0"/>
-          <a:ext cx="0" cy="0"/>
-          <a:chOff x="0" y="0"/>
-          <a:chExt cx="0" cy="0"/>
-        </a:xfrm>
-      </p:grpSpPr>
-      <p:sp>
-        <p:nvSpPr>
-          <p:cNvPr id="4" name="Rectangle 3">
-            <a:extLst>
-              <a:ext uri="{FF2B5EF4-FFF2-40B4-BE49-F238E27FC236}">
-                <a16:creationId xmlns:a16="http://schemas.microsoft.com/office/drawing/2014/main" id="{19C33F28-3D07-8712-0C19-6679577B3F89}"/>
-              </a:ext>
-            </a:extLst>
-          </p:cNvPr>
-          <p:cNvSpPr/>
-          <p:nvPr/>
-        </p:nvSpPr>
-        <p:spPr>
-          <a:xfrm>
-            <a:off x="0" y="-1"/>
-            <a:ext cx="12192000" cy="5770593"/>
-          </a:xfrm>
-          <a:prstGeom prst="rect">
-            <a:avLst/>
-          </a:prstGeom>
-          <a:noFill/>
-          <a:ln w="114300">
-            <a:solidFill>
-              <a:srgbClr val="6B3815"/>
-            </a:solidFill>
-          </a:ln>
-        </p:spPr>
-        <p:style>
-          <a:lnRef idx="2">
-            <a:schemeClr val="accent1">
-              <a:shade val="50000"/>
-            </a:schemeClr>
-          </a:lnRef>
-          <a:fillRef idx="1">
-            <a:schemeClr val="accent1"/>
-          </a:fillRef>
-          <a:effectRef idx="0">
-            <a:schemeClr val="accent1"/>
-          </a:effectRef>
-          <a:fontRef idx="minor">
-            <a:schemeClr val="lt1"/>
-          </a:fontRef>
-        </p:style>
-        <p:txBody>
-          <a:bodyPr rtlCol="0" anchor="ctr"/>
-          <a:lstStyle/>
-          <a:p>
-            <a:pPr algn="ctr"/>
-            <a:endParaRPr lang="en-IL" dirty="0"/>
-          </a:p>
-        </p:txBody>
-      </p:sp>
-      <p:cxnSp>
-        <p:nvCxnSpPr>
-          <p:cNvPr id="6" name="Straight Connector 5">
-            <a:extLst>
-              <a:ext uri="{FF2B5EF4-FFF2-40B4-BE49-F238E27FC236}">
-                <a16:creationId xmlns:a16="http://schemas.microsoft.com/office/drawing/2014/main" id="{ED0D8D8E-40D0-7AD6-F5CC-9EA6E0B213FA}"/>
-              </a:ext>
-            </a:extLst>
-          </p:cNvPr>
-          <p:cNvCxnSpPr>
-            <a:cxnSpLocks/>
-          </p:cNvCxnSpPr>
-          <p:nvPr/>
-        </p:nvCxnSpPr>
-        <p:spPr>
-          <a:xfrm>
-            <a:off x="55959" y="5653624"/>
-            <a:ext cx="12080081" cy="0"/>
-          </a:xfrm>
-          <a:prstGeom prst="line">
-            <a:avLst/>
-          </a:prstGeom>
-          <a:ln w="130175">
-            <a:solidFill>
-              <a:srgbClr val="854E2A"/>
-            </a:solidFill>
-          </a:ln>
-        </p:spPr>
-        <p:style>
-          <a:lnRef idx="1">
-            <a:schemeClr val="accent1"/>
-          </a:lnRef>
-          <a:fillRef idx="0">
-            <a:schemeClr val="accent1"/>
-          </a:fillRef>
-          <a:effectRef idx="0">
-            <a:schemeClr val="accent1"/>
-          </a:effectRef>
-          <a:fontRef idx="minor">
-            <a:schemeClr val="tx1"/>
-          </a:fontRef>
-        </p:style>
-      </p:cxnSp>
-      <p:cxnSp>
-        <p:nvCxnSpPr>
-          <p:cNvPr id="12" name="Straight Connector 11">
-            <a:extLst>
-              <a:ext uri="{FF2B5EF4-FFF2-40B4-BE49-F238E27FC236}">
-                <a16:creationId xmlns:a16="http://schemas.microsoft.com/office/drawing/2014/main" id="{CE1768C1-6CBB-0D43-2A7C-ADA758938813}"/>
-              </a:ext>
-            </a:extLst>
-          </p:cNvPr>
-          <p:cNvCxnSpPr>
-            <a:cxnSpLocks/>
-          </p:cNvCxnSpPr>
-          <p:nvPr/>
-        </p:nvCxnSpPr>
-        <p:spPr>
-          <a:xfrm>
-            <a:off x="-57666" y="5885108"/>
-            <a:ext cx="12344401" cy="0"/>
-          </a:xfrm>
-          <a:prstGeom prst="line">
-            <a:avLst/>
-          </a:prstGeom>
-          <a:ln w="130175">
-            <a:solidFill>
-              <a:schemeClr val="tx1"/>
-            </a:solidFill>
-          </a:ln>
-        </p:spPr>
-        <p:style>
-          <a:lnRef idx="1">
-            <a:schemeClr val="accent1"/>
-          </a:lnRef>
-          <a:fillRef idx="0">
-            <a:schemeClr val="accent1"/>
-          </a:fillRef>
-          <a:effectRef idx="0">
-            <a:schemeClr val="accent1"/>
-          </a:effectRef>
-          <a:fontRef idx="minor">
-            <a:schemeClr val="tx1"/>
-          </a:fontRef>
-        </p:style>
-      </p:cxnSp>
-    </p:spTree>
-    <p:extLst>
-      <p:ext uri="{BB962C8B-B14F-4D97-AF65-F5344CB8AC3E}">
-        <p14:creationId xmlns:p14="http://schemas.microsoft.com/office/powerpoint/2010/main" val="381717333"/>
       </p:ext>
     </p:extLst>
   </p:cSld>
@@ -5195,4 +7695,262 @@
     </a:ext>
   </a:extLst>
 </a:theme>
+</file>
+
+<file path=ppt/theme/themeOverride1.xml><?xml version="1.0" encoding="utf-8"?>
+<a:themeOverride xmlns:a="http://schemas.openxmlformats.org/drawingml/2006/main">
+  <a:clrScheme name="Office">
+    <a:dk1>
+      <a:sysClr val="windowText" lastClr="000000"/>
+    </a:dk1>
+    <a:lt1>
+      <a:sysClr val="window" lastClr="FFFFFF"/>
+    </a:lt1>
+    <a:dk2>
+      <a:srgbClr val="44546A"/>
+    </a:dk2>
+    <a:lt2>
+      <a:srgbClr val="E7E6E6"/>
+    </a:lt2>
+    <a:accent1>
+      <a:srgbClr val="4472C4"/>
+    </a:accent1>
+    <a:accent2>
+      <a:srgbClr val="ED7D31"/>
+    </a:accent2>
+    <a:accent3>
+      <a:srgbClr val="A5A5A5"/>
+    </a:accent3>
+    <a:accent4>
+      <a:srgbClr val="FFC000"/>
+    </a:accent4>
+    <a:accent5>
+      <a:srgbClr val="5B9BD5"/>
+    </a:accent5>
+    <a:accent6>
+      <a:srgbClr val="70AD47"/>
+    </a:accent6>
+    <a:hlink>
+      <a:srgbClr val="0563C1"/>
+    </a:hlink>
+    <a:folHlink>
+      <a:srgbClr val="954F72"/>
+    </a:folHlink>
+  </a:clrScheme>
+</a:themeOverride>
+</file>
+
+<file path=ppt/theme/themeOverride2.xml><?xml version="1.0" encoding="utf-8"?>
+<a:themeOverride xmlns:a="http://schemas.openxmlformats.org/drawingml/2006/main">
+  <a:clrScheme name="Office">
+    <a:dk1>
+      <a:sysClr val="windowText" lastClr="000000"/>
+    </a:dk1>
+    <a:lt1>
+      <a:sysClr val="window" lastClr="FFFFFF"/>
+    </a:lt1>
+    <a:dk2>
+      <a:srgbClr val="44546A"/>
+    </a:dk2>
+    <a:lt2>
+      <a:srgbClr val="E7E6E6"/>
+    </a:lt2>
+    <a:accent1>
+      <a:srgbClr val="4472C4"/>
+    </a:accent1>
+    <a:accent2>
+      <a:srgbClr val="ED7D31"/>
+    </a:accent2>
+    <a:accent3>
+      <a:srgbClr val="A5A5A5"/>
+    </a:accent3>
+    <a:accent4>
+      <a:srgbClr val="FFC000"/>
+    </a:accent4>
+    <a:accent5>
+      <a:srgbClr val="5B9BD5"/>
+    </a:accent5>
+    <a:accent6>
+      <a:srgbClr val="70AD47"/>
+    </a:accent6>
+    <a:hlink>
+      <a:srgbClr val="0563C1"/>
+    </a:hlink>
+    <a:folHlink>
+      <a:srgbClr val="954F72"/>
+    </a:folHlink>
+  </a:clrScheme>
+</a:themeOverride>
+</file>
+
+<file path=ppt/theme/themeOverride3.xml><?xml version="1.0" encoding="utf-8"?>
+<a:themeOverride xmlns:a="http://schemas.openxmlformats.org/drawingml/2006/main">
+  <a:clrScheme name="Office">
+    <a:dk1>
+      <a:sysClr val="windowText" lastClr="000000"/>
+    </a:dk1>
+    <a:lt1>
+      <a:sysClr val="window" lastClr="FFFFFF"/>
+    </a:lt1>
+    <a:dk2>
+      <a:srgbClr val="44546A"/>
+    </a:dk2>
+    <a:lt2>
+      <a:srgbClr val="E7E6E6"/>
+    </a:lt2>
+    <a:accent1>
+      <a:srgbClr val="4472C4"/>
+    </a:accent1>
+    <a:accent2>
+      <a:srgbClr val="ED7D31"/>
+    </a:accent2>
+    <a:accent3>
+      <a:srgbClr val="A5A5A5"/>
+    </a:accent3>
+    <a:accent4>
+      <a:srgbClr val="FFC000"/>
+    </a:accent4>
+    <a:accent5>
+      <a:srgbClr val="5B9BD5"/>
+    </a:accent5>
+    <a:accent6>
+      <a:srgbClr val="70AD47"/>
+    </a:accent6>
+    <a:hlink>
+      <a:srgbClr val="0563C1"/>
+    </a:hlink>
+    <a:folHlink>
+      <a:srgbClr val="954F72"/>
+    </a:folHlink>
+  </a:clrScheme>
+</a:themeOverride>
+</file>
+
+<file path=ppt/theme/themeOverride4.xml><?xml version="1.0" encoding="utf-8"?>
+<a:themeOverride xmlns:a="http://schemas.openxmlformats.org/drawingml/2006/main">
+  <a:clrScheme name="Office">
+    <a:dk1>
+      <a:sysClr val="windowText" lastClr="000000"/>
+    </a:dk1>
+    <a:lt1>
+      <a:sysClr val="window" lastClr="FFFFFF"/>
+    </a:lt1>
+    <a:dk2>
+      <a:srgbClr val="44546A"/>
+    </a:dk2>
+    <a:lt2>
+      <a:srgbClr val="E7E6E6"/>
+    </a:lt2>
+    <a:accent1>
+      <a:srgbClr val="4472C4"/>
+    </a:accent1>
+    <a:accent2>
+      <a:srgbClr val="ED7D31"/>
+    </a:accent2>
+    <a:accent3>
+      <a:srgbClr val="A5A5A5"/>
+    </a:accent3>
+    <a:accent4>
+      <a:srgbClr val="FFC000"/>
+    </a:accent4>
+    <a:accent5>
+      <a:srgbClr val="5B9BD5"/>
+    </a:accent5>
+    <a:accent6>
+      <a:srgbClr val="70AD47"/>
+    </a:accent6>
+    <a:hlink>
+      <a:srgbClr val="0563C1"/>
+    </a:hlink>
+    <a:folHlink>
+      <a:srgbClr val="954F72"/>
+    </a:folHlink>
+  </a:clrScheme>
+</a:themeOverride>
+</file>
+
+<file path=ppt/theme/themeOverride5.xml><?xml version="1.0" encoding="utf-8"?>
+<a:themeOverride xmlns:a="http://schemas.openxmlformats.org/drawingml/2006/main">
+  <a:clrScheme name="Office">
+    <a:dk1>
+      <a:sysClr val="windowText" lastClr="000000"/>
+    </a:dk1>
+    <a:lt1>
+      <a:sysClr val="window" lastClr="FFFFFF"/>
+    </a:lt1>
+    <a:dk2>
+      <a:srgbClr val="44546A"/>
+    </a:dk2>
+    <a:lt2>
+      <a:srgbClr val="E7E6E6"/>
+    </a:lt2>
+    <a:accent1>
+      <a:srgbClr val="4472C4"/>
+    </a:accent1>
+    <a:accent2>
+      <a:srgbClr val="ED7D31"/>
+    </a:accent2>
+    <a:accent3>
+      <a:srgbClr val="A5A5A5"/>
+    </a:accent3>
+    <a:accent4>
+      <a:srgbClr val="FFC000"/>
+    </a:accent4>
+    <a:accent5>
+      <a:srgbClr val="5B9BD5"/>
+    </a:accent5>
+    <a:accent6>
+      <a:srgbClr val="70AD47"/>
+    </a:accent6>
+    <a:hlink>
+      <a:srgbClr val="0563C1"/>
+    </a:hlink>
+    <a:folHlink>
+      <a:srgbClr val="954F72"/>
+    </a:folHlink>
+  </a:clrScheme>
+</a:themeOverride>
+</file>
+
+<file path=ppt/theme/themeOverride6.xml><?xml version="1.0" encoding="utf-8"?>
+<a:themeOverride xmlns:a="http://schemas.openxmlformats.org/drawingml/2006/main">
+  <a:clrScheme name="Office">
+    <a:dk1>
+      <a:sysClr val="windowText" lastClr="000000"/>
+    </a:dk1>
+    <a:lt1>
+      <a:sysClr val="window" lastClr="FFFFFF"/>
+    </a:lt1>
+    <a:dk2>
+      <a:srgbClr val="44546A"/>
+    </a:dk2>
+    <a:lt2>
+      <a:srgbClr val="E7E6E6"/>
+    </a:lt2>
+    <a:accent1>
+      <a:srgbClr val="4472C4"/>
+    </a:accent1>
+    <a:accent2>
+      <a:srgbClr val="ED7D31"/>
+    </a:accent2>
+    <a:accent3>
+      <a:srgbClr val="A5A5A5"/>
+    </a:accent3>
+    <a:accent4>
+      <a:srgbClr val="FFC000"/>
+    </a:accent4>
+    <a:accent5>
+      <a:srgbClr val="5B9BD5"/>
+    </a:accent5>
+    <a:accent6>
+      <a:srgbClr val="70AD47"/>
+    </a:accent6>
+    <a:hlink>
+      <a:srgbClr val="0563C1"/>
+    </a:hlink>
+    <a:folHlink>
+      <a:srgbClr val="954F72"/>
+    </a:folHlink>
+  </a:clrScheme>
+</a:themeOverride>
 </file>
</xml_diff>